<commit_message>
feat: remove unnecessary files
</commit_message>
<xml_diff>
--- a/modules/accounts/assets/intro.pptx
+++ b/modules/accounts/assets/intro.pptx
@@ -5,19 +5,22 @@
     <p:sldMasterId id="2147483672" r:id="rId1"/>
   </p:sldMasterIdLst>
   <p:notesMasterIdLst>
-    <p:notesMasterId r:id="rId12"/>
+    <p:notesMasterId r:id="rId15"/>
   </p:notesMasterIdLst>
   <p:sldIdLst>
     <p:sldId id="256" r:id="rId2"/>
     <p:sldId id="258" r:id="rId3"/>
-    <p:sldId id="262" r:id="rId4"/>
-    <p:sldId id="268" r:id="rId5"/>
-    <p:sldId id="261" r:id="rId6"/>
-    <p:sldId id="263" r:id="rId7"/>
-    <p:sldId id="265" r:id="rId8"/>
-    <p:sldId id="264" r:id="rId9"/>
-    <p:sldId id="266" r:id="rId10"/>
-    <p:sldId id="267" r:id="rId11"/>
+    <p:sldId id="268" r:id="rId4"/>
+    <p:sldId id="261" r:id="rId5"/>
+    <p:sldId id="263" r:id="rId6"/>
+    <p:sldId id="265" r:id="rId7"/>
+    <p:sldId id="264" r:id="rId8"/>
+    <p:sldId id="266" r:id="rId9"/>
+    <p:sldId id="267" r:id="rId10"/>
+    <p:sldId id="269" r:id="rId11"/>
+    <p:sldId id="270" r:id="rId12"/>
+    <p:sldId id="271" r:id="rId13"/>
+    <p:sldId id="272" r:id="rId14"/>
   </p:sldIdLst>
   <p:sldSz cx="9144000" cy="5143500" type="screen16x9"/>
   <p:notesSz cx="6858000" cy="9144000"/>
@@ -208,7 +211,8 @@
           <a:p>
             <a:fld id="{AD9FDEBF-BA54-44D4-8821-ED94C96E1C60}" type="datetimeFigureOut">
               <a:rPr lang="en-US" smtClean="0"/>
-              <a:t>1/22/2017</a:t>
+              <a:pPr/>
+              <a:t>2/1/2017</a:t>
             </a:fld>
             <a:endParaRPr lang="en-US"/>
           </a:p>
@@ -369,6 +373,7 @@
           <a:p>
             <a:fld id="{AE93ECF3-AA3B-43C2-97FA-A9572B770F3D}" type="slidenum">
               <a:rPr lang="en-US" smtClean="0"/>
+              <a:pPr/>
               <a:t>‹#›</a:t>
             </a:fld>
             <a:endParaRPr lang="en-US"/>
@@ -549,7 +554,281 @@
           <a:p>
             <a:fld id="{AE93ECF3-AA3B-43C2-97FA-A9572B770F3D}" type="slidenum">
               <a:rPr lang="en-US" smtClean="0"/>
+              <a:pPr/>
               <a:t>2</a:t>
+            </a:fld>
+            <a:endParaRPr lang="en-US"/>
+          </a:p>
+        </p:txBody>
+      </p:sp>
+    </p:spTree>
+  </p:cSld>
+  <p:clrMapOvr>
+    <a:masterClrMapping/>
+  </p:clrMapOvr>
+</p:notes>
+</file>
+
+<file path=ppt/notesSlides/notesSlide10.xml><?xml version="1.0" encoding="utf-8"?>
+<p:notes xmlns:a="http://schemas.openxmlformats.org/drawingml/2006/main" xmlns:r="http://schemas.openxmlformats.org/officeDocument/2006/relationships" xmlns:p="http://schemas.openxmlformats.org/presentationml/2006/main">
+  <p:cSld>
+    <p:spTree>
+      <p:nvGrpSpPr>
+        <p:cNvPr id="1" name=""/>
+        <p:cNvGrpSpPr/>
+        <p:nvPr/>
+      </p:nvGrpSpPr>
+      <p:grpSpPr>
+        <a:xfrm>
+          <a:off x="0" y="0"/>
+          <a:ext cx="0" cy="0"/>
+          <a:chOff x="0" y="0"/>
+          <a:chExt cx="0" cy="0"/>
+        </a:xfrm>
+      </p:grpSpPr>
+      <p:sp>
+        <p:nvSpPr>
+          <p:cNvPr id="2" name="Slide Image Placeholder 1"/>
+          <p:cNvSpPr>
+            <a:spLocks noGrp="1" noRot="1" noChangeAspect="1"/>
+          </p:cNvSpPr>
+          <p:nvPr>
+            <p:ph type="sldImg"/>
+          </p:nvPr>
+        </p:nvSpPr>
+        <p:spPr>
+          <a:xfrm>
+            <a:off x="381000" y="685800"/>
+            <a:ext cx="6096000" cy="3429000"/>
+          </a:xfrm>
+        </p:spPr>
+      </p:sp>
+      <p:sp>
+        <p:nvSpPr>
+          <p:cNvPr id="3" name="Notes Placeholder 2"/>
+          <p:cNvSpPr>
+            <a:spLocks noGrp="1"/>
+          </p:cNvSpPr>
+          <p:nvPr>
+            <p:ph type="body" idx="1"/>
+          </p:nvPr>
+        </p:nvSpPr>
+        <p:spPr/>
+        <p:txBody>
+          <a:bodyPr>
+            <a:normAutofit/>
+          </a:bodyPr>
+          <a:lstStyle/>
+          <a:p>
+            <a:r>
+              <a:rPr lang="en-US" dirty="0" smtClean="0"/>
+              <a:t>https://www.1001freedownloads.com/free-clipart/question-guy</a:t>
+            </a:r>
+            <a:endParaRPr lang="en-US" dirty="0"/>
+          </a:p>
+        </p:txBody>
+      </p:sp>
+      <p:sp>
+        <p:nvSpPr>
+          <p:cNvPr id="4" name="Slide Number Placeholder 3"/>
+          <p:cNvSpPr>
+            <a:spLocks noGrp="1"/>
+          </p:cNvSpPr>
+          <p:nvPr>
+            <p:ph type="sldNum" sz="quarter" idx="10"/>
+          </p:nvPr>
+        </p:nvSpPr>
+        <p:spPr/>
+        <p:txBody>
+          <a:bodyPr/>
+          <a:lstStyle/>
+          <a:p>
+            <a:fld id="{AE93ECF3-AA3B-43C2-97FA-A9572B770F3D}" type="slidenum">
+              <a:rPr lang="en-US" smtClean="0"/>
+              <a:pPr/>
+              <a:t>11</a:t>
+            </a:fld>
+            <a:endParaRPr lang="en-US"/>
+          </a:p>
+        </p:txBody>
+      </p:sp>
+    </p:spTree>
+  </p:cSld>
+  <p:clrMapOvr>
+    <a:masterClrMapping/>
+  </p:clrMapOvr>
+</p:notes>
+</file>
+
+<file path=ppt/notesSlides/notesSlide11.xml><?xml version="1.0" encoding="utf-8"?>
+<p:notes xmlns:a="http://schemas.openxmlformats.org/drawingml/2006/main" xmlns:r="http://schemas.openxmlformats.org/officeDocument/2006/relationships" xmlns:p="http://schemas.openxmlformats.org/presentationml/2006/main">
+  <p:cSld>
+    <p:spTree>
+      <p:nvGrpSpPr>
+        <p:cNvPr id="1" name=""/>
+        <p:cNvGrpSpPr/>
+        <p:nvPr/>
+      </p:nvGrpSpPr>
+      <p:grpSpPr>
+        <a:xfrm>
+          <a:off x="0" y="0"/>
+          <a:ext cx="0" cy="0"/>
+          <a:chOff x="0" y="0"/>
+          <a:chExt cx="0" cy="0"/>
+        </a:xfrm>
+      </p:grpSpPr>
+      <p:sp>
+        <p:nvSpPr>
+          <p:cNvPr id="2" name="Slide Image Placeholder 1"/>
+          <p:cNvSpPr>
+            <a:spLocks noGrp="1" noRot="1" noChangeAspect="1"/>
+          </p:cNvSpPr>
+          <p:nvPr>
+            <p:ph type="sldImg"/>
+          </p:nvPr>
+        </p:nvSpPr>
+        <p:spPr>
+          <a:xfrm>
+            <a:off x="381000" y="685800"/>
+            <a:ext cx="6096000" cy="3429000"/>
+          </a:xfrm>
+        </p:spPr>
+      </p:sp>
+      <p:sp>
+        <p:nvSpPr>
+          <p:cNvPr id="3" name="Notes Placeholder 2"/>
+          <p:cNvSpPr>
+            <a:spLocks noGrp="1"/>
+          </p:cNvSpPr>
+          <p:nvPr>
+            <p:ph type="body" idx="1"/>
+          </p:nvPr>
+        </p:nvSpPr>
+        <p:spPr/>
+        <p:txBody>
+          <a:bodyPr>
+            <a:normAutofit/>
+          </a:bodyPr>
+          <a:lstStyle/>
+          <a:p>
+            <a:r>
+              <a:rPr lang="en-US" dirty="0" smtClean="0"/>
+              <a:t>https://www.1001freedownloads.com/free-clipart/question-guy</a:t>
+            </a:r>
+            <a:endParaRPr lang="en-US" dirty="0"/>
+          </a:p>
+        </p:txBody>
+      </p:sp>
+      <p:sp>
+        <p:nvSpPr>
+          <p:cNvPr id="4" name="Slide Number Placeholder 3"/>
+          <p:cNvSpPr>
+            <a:spLocks noGrp="1"/>
+          </p:cNvSpPr>
+          <p:nvPr>
+            <p:ph type="sldNum" sz="quarter" idx="10"/>
+          </p:nvPr>
+        </p:nvSpPr>
+        <p:spPr/>
+        <p:txBody>
+          <a:bodyPr/>
+          <a:lstStyle/>
+          <a:p>
+            <a:fld id="{AE93ECF3-AA3B-43C2-97FA-A9572B770F3D}" type="slidenum">
+              <a:rPr lang="en-US" smtClean="0"/>
+              <a:pPr/>
+              <a:t>12</a:t>
+            </a:fld>
+            <a:endParaRPr lang="en-US"/>
+          </a:p>
+        </p:txBody>
+      </p:sp>
+    </p:spTree>
+  </p:cSld>
+  <p:clrMapOvr>
+    <a:masterClrMapping/>
+  </p:clrMapOvr>
+</p:notes>
+</file>
+
+<file path=ppt/notesSlides/notesSlide12.xml><?xml version="1.0" encoding="utf-8"?>
+<p:notes xmlns:a="http://schemas.openxmlformats.org/drawingml/2006/main" xmlns:r="http://schemas.openxmlformats.org/officeDocument/2006/relationships" xmlns:p="http://schemas.openxmlformats.org/presentationml/2006/main">
+  <p:cSld>
+    <p:spTree>
+      <p:nvGrpSpPr>
+        <p:cNvPr id="1" name=""/>
+        <p:cNvGrpSpPr/>
+        <p:nvPr/>
+      </p:nvGrpSpPr>
+      <p:grpSpPr>
+        <a:xfrm>
+          <a:off x="0" y="0"/>
+          <a:ext cx="0" cy="0"/>
+          <a:chOff x="0" y="0"/>
+          <a:chExt cx="0" cy="0"/>
+        </a:xfrm>
+      </p:grpSpPr>
+      <p:sp>
+        <p:nvSpPr>
+          <p:cNvPr id="2" name="Slide Image Placeholder 1"/>
+          <p:cNvSpPr>
+            <a:spLocks noGrp="1" noRot="1" noChangeAspect="1"/>
+          </p:cNvSpPr>
+          <p:nvPr>
+            <p:ph type="sldImg"/>
+          </p:nvPr>
+        </p:nvSpPr>
+        <p:spPr>
+          <a:xfrm>
+            <a:off x="381000" y="685800"/>
+            <a:ext cx="6096000" cy="3429000"/>
+          </a:xfrm>
+        </p:spPr>
+      </p:sp>
+      <p:sp>
+        <p:nvSpPr>
+          <p:cNvPr id="3" name="Notes Placeholder 2"/>
+          <p:cNvSpPr>
+            <a:spLocks noGrp="1"/>
+          </p:cNvSpPr>
+          <p:nvPr>
+            <p:ph type="body" idx="1"/>
+          </p:nvPr>
+        </p:nvSpPr>
+        <p:spPr/>
+        <p:txBody>
+          <a:bodyPr>
+            <a:normAutofit/>
+          </a:bodyPr>
+          <a:lstStyle/>
+          <a:p>
+            <a:r>
+              <a:rPr lang="en-US" dirty="0" smtClean="0"/>
+              <a:t>https://www.1001freedownloads.com/free-clipart/question-guy</a:t>
+            </a:r>
+            <a:endParaRPr lang="en-US" dirty="0"/>
+          </a:p>
+        </p:txBody>
+      </p:sp>
+      <p:sp>
+        <p:nvSpPr>
+          <p:cNvPr id="4" name="Slide Number Placeholder 3"/>
+          <p:cNvSpPr>
+            <a:spLocks noGrp="1"/>
+          </p:cNvSpPr>
+          <p:nvPr>
+            <p:ph type="sldNum" sz="quarter" idx="10"/>
+          </p:nvPr>
+        </p:nvSpPr>
+        <p:spPr/>
+        <p:txBody>
+          <a:bodyPr/>
+          <a:lstStyle/>
+          <a:p>
+            <a:fld id="{AE93ECF3-AA3B-43C2-97FA-A9572B770F3D}" type="slidenum">
+              <a:rPr lang="en-US" smtClean="0"/>
+              <a:pPr/>
+              <a:t>13</a:t>
             </a:fld>
             <a:endParaRPr lang="en-US"/>
           </a:p>
@@ -639,6 +918,7 @@
           <a:p>
             <a:fld id="{AE93ECF3-AA3B-43C2-97FA-A9572B770F3D}" type="slidenum">
               <a:rPr lang="en-US" smtClean="0"/>
+              <a:pPr/>
               <a:t>3</a:t>
             </a:fld>
             <a:endParaRPr lang="en-US"/>
@@ -680,12 +960,7 @@
             <p:ph type="sldImg"/>
           </p:nvPr>
         </p:nvSpPr>
-        <p:spPr>
-          <a:xfrm>
-            <a:off x="381000" y="685800"/>
-            <a:ext cx="6096000" cy="3429000"/>
-          </a:xfrm>
-        </p:spPr>
+        <p:spPr/>
       </p:sp>
       <p:sp>
         <p:nvSpPr>
@@ -706,7 +981,13 @@
           <a:p>
             <a:r>
               <a:rPr lang="en-US" dirty="0" smtClean="0"/>
-              <a:t>https://www.1001freedownloads.com/free-clipart/question-guy</a:t>
+              <a:t>http://www.topdesignmag.com/10-popular-free-to-download-icon-sets-for-web-designers/</a:t>
+            </a:r>
+          </a:p>
+          <a:p>
+            <a:r>
+              <a:rPr lang="en-US" dirty="0" smtClean="0"/>
+              <a:t>http://dakirby309.deviantart.com/art/Metro-UI-Icon-Set-725-Icons-280724102</a:t>
             </a:r>
             <a:endParaRPr lang="en-US" dirty="0"/>
           </a:p>
@@ -729,6 +1010,7 @@
           <a:p>
             <a:fld id="{AE93ECF3-AA3B-43C2-97FA-A9572B770F3D}" type="slidenum">
               <a:rPr lang="en-US" smtClean="0"/>
+              <a:pPr/>
               <a:t>4</a:t>
             </a:fld>
             <a:endParaRPr lang="en-US"/>
@@ -770,7 +1052,12 @@
             <p:ph type="sldImg"/>
           </p:nvPr>
         </p:nvSpPr>
-        <p:spPr/>
+        <p:spPr>
+          <a:xfrm>
+            <a:off x="381000" y="685800"/>
+            <a:ext cx="6096000" cy="3429000"/>
+          </a:xfrm>
+        </p:spPr>
       </p:sp>
       <p:sp>
         <p:nvSpPr>
@@ -791,13 +1078,13 @@
           <a:p>
             <a:r>
               <a:rPr lang="en-US" dirty="0" smtClean="0"/>
-              <a:t>http://www.topdesignmag.com/10-popular-free-to-download-icon-sets-for-web-designers/</a:t>
+              <a:t>https://www.1001freedownloads.com/free-clipart/question-guy</a:t>
             </a:r>
           </a:p>
           <a:p>
             <a:r>
               <a:rPr lang="en-US" dirty="0" smtClean="0"/>
-              <a:t>http://dakirby309.deviantart.com/art/Metro-UI-Icon-Set-725-Icons-280724102</a:t>
+              <a:t>https://www.smashingmagazine.com/wp-content/uploads/2010/10/large-preview.jpg</a:t>
             </a:r>
             <a:endParaRPr lang="en-US" dirty="0"/>
           </a:p>
@@ -820,6 +1107,7 @@
           <a:p>
             <a:fld id="{AE93ECF3-AA3B-43C2-97FA-A9572B770F3D}" type="slidenum">
               <a:rPr lang="en-US" smtClean="0"/>
+              <a:pPr/>
               <a:t>5</a:t>
             </a:fld>
             <a:endParaRPr lang="en-US"/>
@@ -889,12 +1177,6 @@
               <a:rPr lang="en-US" dirty="0" smtClean="0"/>
               <a:t>https://www.1001freedownloads.com/free-clipart/question-guy</a:t>
             </a:r>
-          </a:p>
-          <a:p>
-            <a:r>
-              <a:rPr lang="en-US" dirty="0" smtClean="0"/>
-              <a:t>https://www.smashingmagazine.com/wp-content/uploads/2010/10/large-preview.jpg</a:t>
-            </a:r>
             <a:endParaRPr lang="en-US" dirty="0"/>
           </a:p>
         </p:txBody>
@@ -916,6 +1198,7 @@
           <a:p>
             <a:fld id="{AE93ECF3-AA3B-43C2-97FA-A9572B770F3D}" type="slidenum">
               <a:rPr lang="en-US" smtClean="0"/>
+              <a:pPr/>
               <a:t>6</a:t>
             </a:fld>
             <a:endParaRPr lang="en-US"/>
@@ -1006,6 +1289,7 @@
           <a:p>
             <a:fld id="{AE93ECF3-AA3B-43C2-97FA-A9572B770F3D}" type="slidenum">
               <a:rPr lang="en-US" smtClean="0"/>
+              <a:pPr/>
               <a:t>7</a:t>
             </a:fld>
             <a:endParaRPr lang="en-US"/>
@@ -1075,6 +1359,18 @@
               <a:rPr lang="en-US" dirty="0" smtClean="0"/>
               <a:t>https://www.1001freedownloads.com/free-clipart/question-guy</a:t>
             </a:r>
+          </a:p>
+          <a:p>
+            <a:r>
+              <a:rPr lang="en-US" dirty="0" smtClean="0"/>
+              <a:t>https://www.1001freedownloads.com/free-clipart/diary-5</a:t>
+            </a:r>
+          </a:p>
+          <a:p>
+            <a:r>
+              <a:rPr lang="en-US" dirty="0" smtClean="0"/>
+              <a:t>https://www.1001freedownloads.com/free-clipart/notepad-page</a:t>
+            </a:r>
             <a:endParaRPr lang="en-US" dirty="0"/>
           </a:p>
         </p:txBody>
@@ -1096,6 +1392,7 @@
           <a:p>
             <a:fld id="{AE93ECF3-AA3B-43C2-97FA-A9572B770F3D}" type="slidenum">
               <a:rPr lang="en-US" smtClean="0"/>
+              <a:pPr/>
               <a:t>8</a:t>
             </a:fld>
             <a:endParaRPr lang="en-US"/>
@@ -1165,18 +1462,6 @@
               <a:rPr lang="en-US" dirty="0" smtClean="0"/>
               <a:t>https://www.1001freedownloads.com/free-clipart/question-guy</a:t>
             </a:r>
-          </a:p>
-          <a:p>
-            <a:r>
-              <a:rPr lang="en-US" dirty="0" smtClean="0"/>
-              <a:t>https://www.1001freedownloads.com/free-clipart/diary-5</a:t>
-            </a:r>
-          </a:p>
-          <a:p>
-            <a:r>
-              <a:rPr lang="en-US" dirty="0" smtClean="0"/>
-              <a:t>https://www.1001freedownloads.com/free-clipart/notepad-page</a:t>
-            </a:r>
             <a:endParaRPr lang="en-US" dirty="0"/>
           </a:p>
         </p:txBody>
@@ -1198,6 +1483,7 @@
           <a:p>
             <a:fld id="{AE93ECF3-AA3B-43C2-97FA-A9572B770F3D}" type="slidenum">
               <a:rPr lang="en-US" smtClean="0"/>
+              <a:pPr/>
               <a:t>9</a:t>
             </a:fld>
             <a:endParaRPr lang="en-US"/>
@@ -1288,6 +1574,7 @@
           <a:p>
             <a:fld id="{AE93ECF3-AA3B-43C2-97FA-A9572B770F3D}" type="slidenum">
               <a:rPr lang="en-US" smtClean="0"/>
+              <a:pPr/>
               <a:t>10</a:t>
             </a:fld>
             <a:endParaRPr lang="en-US"/>
@@ -1483,7 +1770,8 @@
           <a:p>
             <a:fld id="{4F37A9AE-A316-424F-9F88-19EFF894DBCC}" type="datetimeFigureOut">
               <a:rPr lang="en-US" smtClean="0"/>
-              <a:t>1/22/2017</a:t>
+              <a:pPr/>
+              <a:t>2/1/2017</a:t>
             </a:fld>
             <a:endParaRPr lang="en-US"/>
           </a:p>
@@ -1525,6 +1813,7 @@
           <a:p>
             <a:fld id="{A198AC52-EA2F-43C9-AF1D-3955099181A3}" type="slidenum">
               <a:rPr lang="en-US" smtClean="0"/>
+              <a:pPr/>
               <a:t>‹#›</a:t>
             </a:fld>
             <a:endParaRPr lang="en-US"/>
@@ -1648,7 +1937,8 @@
           <a:p>
             <a:fld id="{4F37A9AE-A316-424F-9F88-19EFF894DBCC}" type="datetimeFigureOut">
               <a:rPr lang="en-US" smtClean="0"/>
-              <a:t>1/22/2017</a:t>
+              <a:pPr/>
+              <a:t>2/1/2017</a:t>
             </a:fld>
             <a:endParaRPr lang="en-US"/>
           </a:p>
@@ -1690,6 +1980,7 @@
           <a:p>
             <a:fld id="{A198AC52-EA2F-43C9-AF1D-3955099181A3}" type="slidenum">
               <a:rPr lang="en-US" smtClean="0"/>
+              <a:pPr/>
               <a:t>‹#›</a:t>
             </a:fld>
             <a:endParaRPr lang="en-US"/>
@@ -1823,7 +2114,8 @@
           <a:p>
             <a:fld id="{4F37A9AE-A316-424F-9F88-19EFF894DBCC}" type="datetimeFigureOut">
               <a:rPr lang="en-US" smtClean="0"/>
-              <a:t>1/22/2017</a:t>
+              <a:pPr/>
+              <a:t>2/1/2017</a:t>
             </a:fld>
             <a:endParaRPr lang="en-US"/>
           </a:p>
@@ -1865,6 +2157,7 @@
           <a:p>
             <a:fld id="{A198AC52-EA2F-43C9-AF1D-3955099181A3}" type="slidenum">
               <a:rPr lang="en-US" smtClean="0"/>
+              <a:pPr/>
               <a:t>‹#›</a:t>
             </a:fld>
             <a:endParaRPr lang="en-US"/>
@@ -1988,7 +2281,8 @@
           <a:p>
             <a:fld id="{4F37A9AE-A316-424F-9F88-19EFF894DBCC}" type="datetimeFigureOut">
               <a:rPr lang="en-US" smtClean="0"/>
-              <a:t>1/22/2017</a:t>
+              <a:pPr/>
+              <a:t>2/1/2017</a:t>
             </a:fld>
             <a:endParaRPr lang="en-US"/>
           </a:p>
@@ -2030,6 +2324,7 @@
           <a:p>
             <a:fld id="{A198AC52-EA2F-43C9-AF1D-3955099181A3}" type="slidenum">
               <a:rPr lang="en-US" smtClean="0"/>
+              <a:pPr/>
               <a:t>‹#›</a:t>
             </a:fld>
             <a:endParaRPr lang="en-US"/>
@@ -2229,7 +2524,8 @@
           <a:p>
             <a:fld id="{4F37A9AE-A316-424F-9F88-19EFF894DBCC}" type="datetimeFigureOut">
               <a:rPr lang="en-US" smtClean="0"/>
-              <a:t>1/22/2017</a:t>
+              <a:pPr/>
+              <a:t>2/1/2017</a:t>
             </a:fld>
             <a:endParaRPr lang="en-US"/>
           </a:p>
@@ -2271,6 +2567,7 @@
           <a:p>
             <a:fld id="{A198AC52-EA2F-43C9-AF1D-3955099181A3}" type="slidenum">
               <a:rPr lang="en-US" smtClean="0"/>
+              <a:pPr/>
               <a:t>‹#›</a:t>
             </a:fld>
             <a:endParaRPr lang="en-US"/>
@@ -2512,7 +2809,8 @@
           <a:p>
             <a:fld id="{4F37A9AE-A316-424F-9F88-19EFF894DBCC}" type="datetimeFigureOut">
               <a:rPr lang="en-US" smtClean="0"/>
-              <a:t>1/22/2017</a:t>
+              <a:pPr/>
+              <a:t>2/1/2017</a:t>
             </a:fld>
             <a:endParaRPr lang="en-US"/>
           </a:p>
@@ -2554,6 +2852,7 @@
           <a:p>
             <a:fld id="{A198AC52-EA2F-43C9-AF1D-3955099181A3}" type="slidenum">
               <a:rPr lang="en-US" smtClean="0"/>
+              <a:pPr/>
               <a:t>‹#›</a:t>
             </a:fld>
             <a:endParaRPr lang="en-US"/>
@@ -2929,7 +3228,8 @@
           <a:p>
             <a:fld id="{4F37A9AE-A316-424F-9F88-19EFF894DBCC}" type="datetimeFigureOut">
               <a:rPr lang="en-US" smtClean="0"/>
-              <a:t>1/22/2017</a:t>
+              <a:pPr/>
+              <a:t>2/1/2017</a:t>
             </a:fld>
             <a:endParaRPr lang="en-US"/>
           </a:p>
@@ -2971,6 +3271,7 @@
           <a:p>
             <a:fld id="{A198AC52-EA2F-43C9-AF1D-3955099181A3}" type="slidenum">
               <a:rPr lang="en-US" smtClean="0"/>
+              <a:pPr/>
               <a:t>‹#›</a:t>
             </a:fld>
             <a:endParaRPr lang="en-US"/>
@@ -3042,7 +3343,8 @@
           <a:p>
             <a:fld id="{4F37A9AE-A316-424F-9F88-19EFF894DBCC}" type="datetimeFigureOut">
               <a:rPr lang="en-US" smtClean="0"/>
-              <a:t>1/22/2017</a:t>
+              <a:pPr/>
+              <a:t>2/1/2017</a:t>
             </a:fld>
             <a:endParaRPr lang="en-US"/>
           </a:p>
@@ -3084,6 +3386,7 @@
           <a:p>
             <a:fld id="{A198AC52-EA2F-43C9-AF1D-3955099181A3}" type="slidenum">
               <a:rPr lang="en-US" smtClean="0"/>
+              <a:pPr/>
               <a:t>‹#›</a:t>
             </a:fld>
             <a:endParaRPr lang="en-US"/>
@@ -3132,7 +3435,8 @@
           <a:p>
             <a:fld id="{4F37A9AE-A316-424F-9F88-19EFF894DBCC}" type="datetimeFigureOut">
               <a:rPr lang="en-US" smtClean="0"/>
-              <a:t>1/22/2017</a:t>
+              <a:pPr/>
+              <a:t>2/1/2017</a:t>
             </a:fld>
             <a:endParaRPr lang="en-US"/>
           </a:p>
@@ -3174,6 +3478,7 @@
           <a:p>
             <a:fld id="{A198AC52-EA2F-43C9-AF1D-3955099181A3}" type="slidenum">
               <a:rPr lang="en-US" smtClean="0"/>
+              <a:pPr/>
               <a:t>‹#›</a:t>
             </a:fld>
             <a:endParaRPr lang="en-US"/>
@@ -3404,7 +3709,8 @@
           <a:p>
             <a:fld id="{4F37A9AE-A316-424F-9F88-19EFF894DBCC}" type="datetimeFigureOut">
               <a:rPr lang="en-US" smtClean="0"/>
-              <a:t>1/22/2017</a:t>
+              <a:pPr/>
+              <a:t>2/1/2017</a:t>
             </a:fld>
             <a:endParaRPr lang="en-US"/>
           </a:p>
@@ -3446,6 +3752,7 @@
           <a:p>
             <a:fld id="{A198AC52-EA2F-43C9-AF1D-3955099181A3}" type="slidenum">
               <a:rPr lang="en-US" smtClean="0"/>
+              <a:pPr/>
               <a:t>‹#›</a:t>
             </a:fld>
             <a:endParaRPr lang="en-US"/>
@@ -3652,7 +3959,8 @@
           <a:p>
             <a:fld id="{4F37A9AE-A316-424F-9F88-19EFF894DBCC}" type="datetimeFigureOut">
               <a:rPr lang="en-US" smtClean="0"/>
-              <a:t>1/22/2017</a:t>
+              <a:pPr/>
+              <a:t>2/1/2017</a:t>
             </a:fld>
             <a:endParaRPr lang="en-US"/>
           </a:p>
@@ -3694,6 +4002,7 @@
           <a:p>
             <a:fld id="{A198AC52-EA2F-43C9-AF1D-3955099181A3}" type="slidenum">
               <a:rPr lang="en-US" smtClean="0"/>
+              <a:pPr/>
               <a:t>‹#›</a:t>
             </a:fld>
             <a:endParaRPr lang="en-US"/>
@@ -3860,7 +4169,8 @@
           <a:p>
             <a:fld id="{4F37A9AE-A316-424F-9F88-19EFF894DBCC}" type="datetimeFigureOut">
               <a:rPr lang="en-US" smtClean="0"/>
-              <a:t>1/22/2017</a:t>
+              <a:pPr/>
+              <a:t>2/1/2017</a:t>
             </a:fld>
             <a:endParaRPr lang="en-US"/>
           </a:p>
@@ -3938,6 +4248,7 @@
           <a:p>
             <a:fld id="{A198AC52-EA2F-43C9-AF1D-3955099181A3}" type="slidenum">
               <a:rPr lang="en-US" smtClean="0"/>
+              <a:pPr/>
               <a:t>‹#›</a:t>
             </a:fld>
             <a:endParaRPr lang="en-US"/>
@@ -4303,21 +4614,13 @@
           <a:p>
             <a:r>
               <a:rPr lang="en-US" b="1" dirty="0" smtClean="0"/>
-              <a:t>A Secured &amp; Encrypted Personal Information Manager</a:t>
-            </a:r>
-            <a:r>
-              <a:rPr lang="en-US" b="1" dirty="0" smtClean="0"/>
-              <a:t>.</a:t>
+              <a:t>A Secured &amp; Encrypted Personal Information Manager.</a:t>
             </a:r>
           </a:p>
           <a:p>
             <a:r>
               <a:rPr lang="en-US" dirty="0" smtClean="0"/>
-              <a:t>www.lockessential.com</a:t>
-            </a:r>
-            <a:r>
-              <a:rPr lang="en-US" dirty="0" smtClean="0"/>
-              <a:t> </a:t>
+              <a:t>www.lockessential.com </a:t>
             </a:r>
             <a:endParaRPr lang="en-US" dirty="0"/>
           </a:p>
@@ -4458,7 +4761,9 @@
     <p:bg>
       <p:bgPr>
         <a:solidFill>
-          <a:schemeClr val="bg1"/>
+          <a:schemeClr val="accent3">
+            <a:lumMod val="75000"/>
+          </a:schemeClr>
         </a:solidFill>
         <a:effectLst/>
       </p:bgPr>
@@ -4477,95 +4782,6 @@
           <a:chExt cx="0" cy="0"/>
         </a:xfrm>
       </p:grpSpPr>
-      <p:sp>
-        <p:nvSpPr>
-          <p:cNvPr id="4" name="Rounded Rectangle 3"/>
-          <p:cNvSpPr/>
-          <p:nvPr/>
-        </p:nvSpPr>
-        <p:spPr>
-          <a:xfrm>
-            <a:off x="3733800" y="819150"/>
-            <a:ext cx="4191000" cy="3733800"/>
-          </a:xfrm>
-          <a:prstGeom prst="roundRect">
-            <a:avLst>
-              <a:gd name="adj" fmla="val 5029"/>
-            </a:avLst>
-          </a:prstGeom>
-          <a:ln>
-            <a:noFill/>
-          </a:ln>
-          <a:effectLst>
-            <a:outerShdw blurRad="76200" dir="18900000" sy="23000" kx="-1200000" algn="bl" rotWithShape="0">
-              <a:prstClr val="black">
-                <a:alpha val="16000"/>
-              </a:prstClr>
-            </a:outerShdw>
-          </a:effectLst>
-        </p:spPr>
-        <p:style>
-          <a:lnRef idx="1">
-            <a:schemeClr val="accent4"/>
-          </a:lnRef>
-          <a:fillRef idx="2">
-            <a:schemeClr val="accent4"/>
-          </a:fillRef>
-          <a:effectRef idx="1">
-            <a:schemeClr val="accent4"/>
-          </a:effectRef>
-          <a:fontRef idx="minor">
-            <a:schemeClr val="dk1"/>
-          </a:fontRef>
-        </p:style>
-        <p:txBody>
-          <a:bodyPr rtlCol="0" anchor="ctr"/>
-          <a:lstStyle/>
-          <a:p>
-            <a:pPr algn="ctr"/>
-            <a:r>
-              <a:rPr lang="en-US" sz="4000" b="1" dirty="0" smtClean="0">
-                <a:solidFill>
-                  <a:schemeClr val="tx1"/>
-                </a:solidFill>
-              </a:rPr>
-              <a:t>Using </a:t>
-            </a:r>
-          </a:p>
-          <a:p>
-            <a:pPr algn="ctr"/>
-            <a:r>
-              <a:rPr lang="en-US" sz="8000" b="1" dirty="0" smtClean="0">
-                <a:solidFill>
-                  <a:schemeClr val="accent1"/>
-                </a:solidFill>
-              </a:rPr>
-              <a:t>Word Excel </a:t>
-            </a:r>
-            <a:endParaRPr lang="en-US" sz="4000" b="1" dirty="0">
-              <a:solidFill>
-                <a:schemeClr val="tx1"/>
-              </a:solidFill>
-            </a:endParaRPr>
-          </a:p>
-          <a:p>
-            <a:pPr algn="ctr"/>
-            <a:r>
-              <a:rPr lang="en-US" sz="4000" b="1" dirty="0" smtClean="0">
-                <a:solidFill>
-                  <a:schemeClr val="tx1"/>
-                </a:solidFill>
-              </a:rPr>
-              <a:t>to save? </a:t>
-            </a:r>
-            <a:endParaRPr lang="en-US" sz="4000" b="1" dirty="0">
-              <a:solidFill>
-                <a:schemeClr val="accent1"/>
-              </a:solidFill>
-            </a:endParaRPr>
-          </a:p>
-        </p:txBody>
-      </p:sp>
       <p:pic>
         <p:nvPicPr>
           <p:cNvPr id="1026" name="Picture 2" descr="Free Clipart: Question Guy | People"/>
@@ -4599,126 +4815,152 @@
           </a:effectLst>
         </p:spPr>
       </p:pic>
-      <p:grpSp>
-        <p:nvGrpSpPr>
-          <p:cNvPr id="2" name="Group 6"/>
-          <p:cNvGrpSpPr/>
+      <p:sp>
+        <p:nvSpPr>
+          <p:cNvPr id="6" name="Rectangle 5"/>
+          <p:cNvSpPr/>
           <p:nvPr/>
-        </p:nvGrpSpPr>
-        <p:grpSpPr>
+        </p:nvSpPr>
+        <p:spPr>
           <a:xfrm>
-            <a:off x="3581400" y="133350"/>
-            <a:ext cx="4572000" cy="4876800"/>
-            <a:chOff x="3581400" y="133350"/>
-            <a:chExt cx="4572000" cy="4876800"/>
+            <a:off x="1905000" y="209550"/>
+            <a:ext cx="7010400" cy="1077218"/>
           </a:xfrm>
-        </p:grpSpPr>
-        <p:sp>
-          <p:nvSpPr>
-            <p:cNvPr id="5" name="&quot;No&quot; Symbol 4"/>
-            <p:cNvSpPr/>
-            <p:nvPr/>
-          </p:nvSpPr>
-          <p:spPr>
-            <a:xfrm>
-              <a:off x="3581400" y="133350"/>
-              <a:ext cx="4572000" cy="4876800"/>
-            </a:xfrm>
-            <a:prstGeom prst="noSmoking">
-              <a:avLst>
-                <a:gd name="adj" fmla="val 12353"/>
-              </a:avLst>
-            </a:prstGeom>
-            <a:solidFill>
-              <a:srgbClr val="FF0000">
-                <a:alpha val="76000"/>
-              </a:srgbClr>
-            </a:solidFill>
-          </p:spPr>
-          <p:style>
-            <a:lnRef idx="2">
-              <a:schemeClr val="accent1">
-                <a:shade val="50000"/>
-              </a:schemeClr>
-            </a:lnRef>
-            <a:fillRef idx="1">
-              <a:schemeClr val="accent1"/>
-            </a:fillRef>
-            <a:effectRef idx="0">
-              <a:schemeClr val="accent1"/>
-            </a:effectRef>
-            <a:fontRef idx="minor">
-              <a:schemeClr val="lt1"/>
-            </a:fontRef>
-          </p:style>
-          <p:txBody>
-            <a:bodyPr rtlCol="0" anchor="ctr"/>
-            <a:lstStyle/>
-            <a:p>
-              <a:pPr algn="ctr"/>
-              <a:endParaRPr lang="en-US">
+          <a:prstGeom prst="rect">
+            <a:avLst/>
+          </a:prstGeom>
+        </p:spPr>
+        <p:txBody>
+          <a:bodyPr wrap="square">
+            <a:spAutoFit/>
+          </a:bodyPr>
+          <a:lstStyle/>
+          <a:p>
+            <a:pPr algn="ctr"/>
+            <a:r>
+              <a:rPr lang="en-US" sz="3200" dirty="0" smtClean="0">
                 <a:solidFill>
-                  <a:schemeClr val="tx1"/>
+                  <a:schemeClr val="accent2">
+                    <a:lumMod val="20000"/>
+                    <a:lumOff val="80000"/>
+                  </a:schemeClr>
                 </a:solidFill>
-              </a:endParaRPr>
-            </a:p>
-          </p:txBody>
-        </p:sp>
-        <p:sp>
-          <p:nvSpPr>
-            <p:cNvPr id="6" name="TextBox 5"/>
-            <p:cNvSpPr txBox="1"/>
-            <p:nvPr/>
-          </p:nvSpPr>
-          <p:spPr>
-            <a:xfrm>
-              <a:off x="3820391" y="4050723"/>
-              <a:ext cx="4038600" cy="953453"/>
-            </a:xfrm>
-            <a:prstGeom prst="roundRect">
-              <a:avLst/>
-            </a:prstGeom>
-            <a:ln>
-              <a:noFill/>
-            </a:ln>
-          </p:spPr>
-          <p:style>
-            <a:lnRef idx="1">
-              <a:schemeClr val="accent2"/>
-            </a:lnRef>
-            <a:fillRef idx="3">
-              <a:schemeClr val="accent2"/>
-            </a:fillRef>
-            <a:effectRef idx="2">
-              <a:schemeClr val="accent2"/>
-            </a:effectRef>
-            <a:fontRef idx="minor">
-              <a:schemeClr val="lt1"/>
-            </a:fontRef>
-          </p:style>
-          <p:txBody>
-            <a:bodyPr wrap="square" rtlCol="0">
-              <a:spAutoFit/>
-            </a:bodyPr>
-            <a:lstStyle/>
-            <a:p>
-              <a:pPr algn="ctr"/>
-              <a:r>
-                <a:rPr lang="en-US" sz="5000" b="1" dirty="0" smtClean="0"/>
-                <a:t>Wrong</a:t>
-              </a:r>
-              <a:endParaRPr lang="en-US" sz="5000" b="1" dirty="0"/>
-            </a:p>
-          </p:txBody>
-        </p:sp>
-      </p:grpSp>
+              </a:rPr>
+              <a:t>Here comes lock essential</a:t>
+            </a:r>
+          </a:p>
+          <a:p>
+            <a:pPr algn="ctr"/>
+            <a:r>
+              <a:rPr lang="en-US" sz="3200" b="1" dirty="0" smtClean="0">
+                <a:solidFill>
+                  <a:schemeClr val="accent2">
+                    <a:lumMod val="20000"/>
+                    <a:lumOff val="80000"/>
+                  </a:schemeClr>
+                </a:solidFill>
+              </a:rPr>
+              <a:t>Your personal information manager</a:t>
+            </a:r>
+            <a:endParaRPr lang="en-US" sz="3200" b="1" dirty="0" smtClean="0">
+              <a:solidFill>
+                <a:schemeClr val="accent2">
+                  <a:lumMod val="20000"/>
+                  <a:lumOff val="80000"/>
+                </a:schemeClr>
+              </a:solidFill>
+            </a:endParaRPr>
+          </a:p>
+        </p:txBody>
+      </p:sp>
+      <p:sp>
+        <p:nvSpPr>
+          <p:cNvPr id="11" name="Rectangle 10"/>
+          <p:cNvSpPr/>
+          <p:nvPr/>
+        </p:nvSpPr>
+        <p:spPr>
+          <a:xfrm>
+            <a:off x="4191000" y="1504950"/>
+            <a:ext cx="4052840" cy="2400657"/>
+          </a:xfrm>
+          <a:prstGeom prst="rect">
+            <a:avLst/>
+          </a:prstGeom>
+        </p:spPr>
+        <p:txBody>
+          <a:bodyPr wrap="none">
+            <a:spAutoFit/>
+          </a:bodyPr>
+          <a:lstStyle/>
+          <a:p>
+            <a:pPr algn="ctr">
+              <a:buFont typeface="Arial" pitchFamily="34" charset="0"/>
+              <a:buChar char="•"/>
+            </a:pPr>
+            <a:r>
+              <a:rPr lang="en-US" sz="5000" dirty="0" smtClean="0">
+                <a:solidFill>
+                  <a:schemeClr val="accent2">
+                    <a:lumMod val="20000"/>
+                    <a:lumOff val="80000"/>
+                  </a:schemeClr>
+                </a:solidFill>
+              </a:rPr>
+              <a:t> Simple to use</a:t>
+            </a:r>
+          </a:p>
+          <a:p>
+            <a:pPr algn="ctr">
+              <a:buFont typeface="Arial" pitchFamily="34" charset="0"/>
+              <a:buChar char="•"/>
+            </a:pPr>
+            <a:r>
+              <a:rPr lang="en-US" sz="5000" dirty="0" smtClean="0">
+                <a:solidFill>
+                  <a:schemeClr val="accent2">
+                    <a:lumMod val="20000"/>
+                    <a:lumOff val="80000"/>
+                  </a:schemeClr>
+                </a:solidFill>
+              </a:rPr>
+              <a:t>Open Source</a:t>
+            </a:r>
+          </a:p>
+          <a:p>
+            <a:pPr algn="ctr">
+              <a:buFont typeface="Arial" pitchFamily="34" charset="0"/>
+              <a:buChar char="•"/>
+            </a:pPr>
+            <a:r>
+              <a:rPr lang="en-US" sz="5000" dirty="0" smtClean="0">
+                <a:solidFill>
+                  <a:schemeClr val="accent2">
+                    <a:lumMod val="20000"/>
+                    <a:lumOff val="80000"/>
+                  </a:schemeClr>
+                </a:solidFill>
+              </a:rPr>
+              <a:t>Free</a:t>
+            </a:r>
+            <a:endParaRPr lang="en-US" sz="5000" dirty="0" smtClean="0">
+              <a:solidFill>
+                <a:schemeClr val="accent2">
+                  <a:lumMod val="20000"/>
+                  <a:lumOff val="80000"/>
+                </a:schemeClr>
+              </a:solidFill>
+            </a:endParaRPr>
+          </a:p>
+        </p:txBody>
+      </p:sp>
     </p:spTree>
   </p:cSld>
   <p:clrMapOvr>
     <a:masterClrMapping/>
   </p:clrMapOvr>
-  <p:transition advTm="3000">
-    <p:pull/>
+  <p:transition advClick="0" advTm="6000">
+    <p:wipe dir="r"/>
   </p:transition>
   <p:timing>
     <p:tnLst>
@@ -4732,6 +4974,9 @@
                     <p:cTn id="3" fill="hold">
                       <p:stCondLst>
                         <p:cond delay="indefinite"/>
+                        <p:cond evt="onBegin" delay="0">
+                          <p:tn val="2"/>
+                        </p:cond>
                       </p:stCondLst>
                       <p:childTnLst>
                         <p:par>
@@ -4741,7 +4986,7 @@
                             </p:stCondLst>
                             <p:childTnLst>
                               <p:par>
-                                <p:cTn id="5" presetID="1" presetClass="entr" presetSubtype="0" fill="hold" nodeType="clickEffect">
+                                <p:cTn id="5" presetID="1" presetClass="entr" presetSubtype="0" fill="hold" grpId="0" nodeType="afterEffect">
                                   <p:stCondLst>
                                     <p:cond delay="0"/>
                                   </p:stCondLst>
@@ -4754,7 +4999,43 @@
                                           </p:stCondLst>
                                         </p:cTn>
                                         <p:tgtEl>
-                                          <p:spTgt spid="2"/>
+                                          <p:spTgt spid="6"/>
+                                        </p:tgtEl>
+                                        <p:attrNameLst>
+                                          <p:attrName>style.visibility</p:attrName>
+                                        </p:attrNameLst>
+                                      </p:cBhvr>
+                                      <p:to>
+                                        <p:strVal val="visible"/>
+                                      </p:to>
+                                    </p:set>
+                                  </p:childTnLst>
+                                </p:cTn>
+                              </p:par>
+                            </p:childTnLst>
+                          </p:cTn>
+                        </p:par>
+                        <p:par>
+                          <p:cTn id="7" fill="hold">
+                            <p:stCondLst>
+                              <p:cond delay="0"/>
+                            </p:stCondLst>
+                            <p:childTnLst>
+                              <p:par>
+                                <p:cTn id="8" presetID="1" presetClass="entr" presetSubtype="0" fill="hold" grpId="0" nodeType="afterEffect">
+                                  <p:stCondLst>
+                                    <p:cond delay="500"/>
+                                  </p:stCondLst>
+                                  <p:childTnLst>
+                                    <p:set>
+                                      <p:cBhvr>
+                                        <p:cTn id="9" dur="1" fill="hold">
+                                          <p:stCondLst>
+                                            <p:cond delay="0"/>
+                                          </p:stCondLst>
+                                        </p:cTn>
+                                        <p:tgtEl>
+                                          <p:spTgt spid="11"/>
                                         </p:tgtEl>
                                         <p:attrNameLst>
                                           <p:attrName>style.visibility</p:attrName>
@@ -4794,6 +5075,980 @@
         </p:cTn>
       </p:par>
     </p:tnLst>
+    <p:bldLst>
+      <p:bldP spid="6" grpId="0"/>
+      <p:bldP spid="11" grpId="0"/>
+    </p:bldLst>
+  </p:timing>
+</p:sld>
+</file>
+
+<file path=ppt/slides/slide11.xml><?xml version="1.0" encoding="utf-8"?>
+<p:sld xmlns:a="http://schemas.openxmlformats.org/drawingml/2006/main" xmlns:r="http://schemas.openxmlformats.org/officeDocument/2006/relationships" xmlns:p="http://schemas.openxmlformats.org/presentationml/2006/main">
+  <p:cSld>
+    <p:bg>
+      <p:bgPr>
+        <a:solidFill>
+          <a:schemeClr val="accent3">
+            <a:lumMod val="75000"/>
+          </a:schemeClr>
+        </a:solidFill>
+        <a:effectLst/>
+      </p:bgPr>
+    </p:bg>
+    <p:spTree>
+      <p:nvGrpSpPr>
+        <p:cNvPr id="1" name=""/>
+        <p:cNvGrpSpPr/>
+        <p:nvPr/>
+      </p:nvGrpSpPr>
+      <p:grpSpPr>
+        <a:xfrm>
+          <a:off x="0" y="0"/>
+          <a:ext cx="0" cy="0"/>
+          <a:chOff x="0" y="0"/>
+          <a:chExt cx="0" cy="0"/>
+        </a:xfrm>
+      </p:grpSpPr>
+      <p:pic>
+        <p:nvPicPr>
+          <p:cNvPr id="1026" name="Picture 2" descr="Free Clipart: Question Guy | People"/>
+          <p:cNvPicPr>
+            <a:picLocks noChangeAspect="1" noChangeArrowheads="1"/>
+          </p:cNvPicPr>
+          <p:nvPr/>
+        </p:nvPicPr>
+        <p:blipFill>
+          <a:blip r:embed="rId3" cstate="print"/>
+          <a:srcRect/>
+          <a:stretch>
+            <a:fillRect/>
+          </a:stretch>
+        </p:blipFill>
+        <p:spPr bwMode="auto">
+          <a:xfrm>
+            <a:off x="-1" y="3240558"/>
+            <a:ext cx="1676401" cy="1902942"/>
+          </a:xfrm>
+          <a:prstGeom prst="rect">
+            <a:avLst/>
+          </a:prstGeom>
+          <a:noFill/>
+          <a:effectLst>
+            <a:outerShdw blurRad="76200" dir="18900000" sy="23000" kx="-1200000" algn="bl" rotWithShape="0">
+              <a:prstClr val="black">
+                <a:alpha val="20000"/>
+              </a:prstClr>
+            </a:outerShdw>
+          </a:effectLst>
+        </p:spPr>
+      </p:pic>
+      <p:sp>
+        <p:nvSpPr>
+          <p:cNvPr id="6" name="Rectangle 5"/>
+          <p:cNvSpPr/>
+          <p:nvPr/>
+        </p:nvSpPr>
+        <p:spPr>
+          <a:xfrm>
+            <a:off x="0" y="209550"/>
+            <a:ext cx="9144000" cy="584775"/>
+          </a:xfrm>
+          <a:prstGeom prst="rect">
+            <a:avLst/>
+          </a:prstGeom>
+        </p:spPr>
+        <p:txBody>
+          <a:bodyPr wrap="square">
+            <a:spAutoFit/>
+          </a:bodyPr>
+          <a:lstStyle/>
+          <a:p>
+            <a:pPr algn="ctr"/>
+            <a:r>
+              <a:rPr lang="en-US" sz="3200" dirty="0" smtClean="0">
+                <a:solidFill>
+                  <a:schemeClr val="accent2">
+                    <a:lumMod val="20000"/>
+                    <a:lumOff val="80000"/>
+                  </a:schemeClr>
+                </a:solidFill>
+              </a:rPr>
+              <a:t>How it secures data?</a:t>
+            </a:r>
+            <a:endParaRPr lang="en-US" sz="3200" b="1" dirty="0" smtClean="0">
+              <a:solidFill>
+                <a:schemeClr val="accent2">
+                  <a:lumMod val="20000"/>
+                  <a:lumOff val="80000"/>
+                </a:schemeClr>
+              </a:solidFill>
+            </a:endParaRPr>
+          </a:p>
+        </p:txBody>
+      </p:sp>
+      <p:sp>
+        <p:nvSpPr>
+          <p:cNvPr id="11" name="Rectangle 10"/>
+          <p:cNvSpPr/>
+          <p:nvPr/>
+        </p:nvSpPr>
+        <p:spPr>
+          <a:xfrm>
+            <a:off x="838200" y="895350"/>
+            <a:ext cx="8305800" cy="3939540"/>
+          </a:xfrm>
+          <a:prstGeom prst="rect">
+            <a:avLst/>
+          </a:prstGeom>
+        </p:spPr>
+        <p:txBody>
+          <a:bodyPr wrap="square">
+            <a:spAutoFit/>
+          </a:bodyPr>
+          <a:lstStyle/>
+          <a:p>
+            <a:pPr algn="ctr">
+              <a:buFont typeface="Arial" pitchFamily="34" charset="0"/>
+              <a:buChar char="•"/>
+            </a:pPr>
+            <a:r>
+              <a:rPr lang="en-US" sz="5000" dirty="0" smtClean="0">
+                <a:solidFill>
+                  <a:schemeClr val="accent2">
+                    <a:lumMod val="20000"/>
+                    <a:lumOff val="80000"/>
+                  </a:schemeClr>
+                </a:solidFill>
+              </a:rPr>
+              <a:t> AES encryption</a:t>
+            </a:r>
+          </a:p>
+          <a:p>
+            <a:pPr algn="ctr">
+              <a:buFont typeface="Arial" pitchFamily="34" charset="0"/>
+              <a:buChar char="•"/>
+            </a:pPr>
+            <a:r>
+              <a:rPr lang="en-US" sz="5000" dirty="0" smtClean="0">
+                <a:solidFill>
+                  <a:schemeClr val="accent2">
+                    <a:lumMod val="20000"/>
+                    <a:lumOff val="80000"/>
+                  </a:schemeClr>
+                </a:solidFill>
+              </a:rPr>
+              <a:t>SSL encryption</a:t>
+            </a:r>
+          </a:p>
+          <a:p>
+            <a:pPr algn="ctr">
+              <a:buFont typeface="Arial" pitchFamily="34" charset="0"/>
+              <a:buChar char="•"/>
+            </a:pPr>
+            <a:r>
+              <a:rPr lang="en-US" sz="5000" dirty="0" smtClean="0">
+                <a:solidFill>
+                  <a:schemeClr val="accent2">
+                    <a:lumMod val="20000"/>
+                    <a:lumOff val="80000"/>
+                  </a:schemeClr>
+                </a:solidFill>
+              </a:rPr>
+              <a:t>Client side + server side</a:t>
+            </a:r>
+          </a:p>
+          <a:p>
+            <a:pPr algn="ctr">
+              <a:buFont typeface="Arial" pitchFamily="34" charset="0"/>
+              <a:buChar char="•"/>
+            </a:pPr>
+            <a:r>
+              <a:rPr lang="en-US" sz="5000" dirty="0" smtClean="0">
+                <a:solidFill>
+                  <a:schemeClr val="accent2">
+                    <a:lumMod val="20000"/>
+                    <a:lumOff val="80000"/>
+                  </a:schemeClr>
+                </a:solidFill>
+              </a:rPr>
+              <a:t>4 layer protection</a:t>
+            </a:r>
+          </a:p>
+          <a:p>
+            <a:pPr algn="ctr">
+              <a:buFont typeface="Arial" pitchFamily="34" charset="0"/>
+              <a:buChar char="•"/>
+            </a:pPr>
+            <a:endParaRPr lang="en-US" sz="5000" dirty="0" smtClean="0">
+              <a:solidFill>
+                <a:schemeClr val="accent2">
+                  <a:lumMod val="20000"/>
+                  <a:lumOff val="80000"/>
+                </a:schemeClr>
+              </a:solidFill>
+            </a:endParaRPr>
+          </a:p>
+        </p:txBody>
+      </p:sp>
+    </p:spTree>
+  </p:cSld>
+  <p:clrMapOvr>
+    <a:masterClrMapping/>
+  </p:clrMapOvr>
+  <p:transition advClick="0" advTm="6000">
+    <p:wipe dir="r"/>
+  </p:transition>
+  <p:timing>
+    <p:tnLst>
+      <p:par>
+        <p:cTn id="1" dur="indefinite" restart="never" nodeType="tmRoot">
+          <p:childTnLst>
+            <p:seq concurrent="1" nextAc="seek">
+              <p:cTn id="2" dur="indefinite" nodeType="mainSeq">
+                <p:childTnLst>
+                  <p:par>
+                    <p:cTn id="3" fill="hold">
+                      <p:stCondLst>
+                        <p:cond delay="indefinite"/>
+                        <p:cond evt="onBegin" delay="0">
+                          <p:tn val="2"/>
+                        </p:cond>
+                      </p:stCondLst>
+                      <p:childTnLst>
+                        <p:par>
+                          <p:cTn id="4" fill="hold">
+                            <p:stCondLst>
+                              <p:cond delay="0"/>
+                            </p:stCondLst>
+                            <p:childTnLst>
+                              <p:par>
+                                <p:cTn id="5" presetID="1" presetClass="entr" presetSubtype="0" fill="hold" grpId="0" nodeType="afterEffect">
+                                  <p:stCondLst>
+                                    <p:cond delay="0"/>
+                                  </p:stCondLst>
+                                  <p:childTnLst>
+                                    <p:set>
+                                      <p:cBhvr>
+                                        <p:cTn id="6" dur="1" fill="hold">
+                                          <p:stCondLst>
+                                            <p:cond delay="0"/>
+                                          </p:stCondLst>
+                                        </p:cTn>
+                                        <p:tgtEl>
+                                          <p:spTgt spid="6"/>
+                                        </p:tgtEl>
+                                        <p:attrNameLst>
+                                          <p:attrName>style.visibility</p:attrName>
+                                        </p:attrNameLst>
+                                      </p:cBhvr>
+                                      <p:to>
+                                        <p:strVal val="visible"/>
+                                      </p:to>
+                                    </p:set>
+                                  </p:childTnLst>
+                                </p:cTn>
+                              </p:par>
+                            </p:childTnLst>
+                          </p:cTn>
+                        </p:par>
+                        <p:par>
+                          <p:cTn id="7" fill="hold">
+                            <p:stCondLst>
+                              <p:cond delay="0"/>
+                            </p:stCondLst>
+                            <p:childTnLst>
+                              <p:par>
+                                <p:cTn id="8" presetID="1" presetClass="entr" presetSubtype="0" fill="hold" grpId="0" nodeType="afterEffect">
+                                  <p:stCondLst>
+                                    <p:cond delay="500"/>
+                                  </p:stCondLst>
+                                  <p:childTnLst>
+                                    <p:set>
+                                      <p:cBhvr>
+                                        <p:cTn id="9" dur="1" fill="hold">
+                                          <p:stCondLst>
+                                            <p:cond delay="0"/>
+                                          </p:stCondLst>
+                                        </p:cTn>
+                                        <p:tgtEl>
+                                          <p:spTgt spid="11"/>
+                                        </p:tgtEl>
+                                        <p:attrNameLst>
+                                          <p:attrName>style.visibility</p:attrName>
+                                        </p:attrNameLst>
+                                      </p:cBhvr>
+                                      <p:to>
+                                        <p:strVal val="visible"/>
+                                      </p:to>
+                                    </p:set>
+                                  </p:childTnLst>
+                                </p:cTn>
+                              </p:par>
+                            </p:childTnLst>
+                          </p:cTn>
+                        </p:par>
+                      </p:childTnLst>
+                    </p:cTn>
+                  </p:par>
+                </p:childTnLst>
+              </p:cTn>
+              <p:prevCondLst>
+                <p:cond evt="onPrev" delay="0">
+                  <p:tgtEl>
+                    <p:sldTgt/>
+                  </p:tgtEl>
+                </p:cond>
+              </p:prevCondLst>
+              <p:nextCondLst>
+                <p:cond evt="onNext" delay="0">
+                  <p:tgtEl>
+                    <p:sldTgt/>
+                  </p:tgtEl>
+                </p:cond>
+              </p:nextCondLst>
+            </p:seq>
+          </p:childTnLst>
+        </p:cTn>
+      </p:par>
+    </p:tnLst>
+    <p:bldLst>
+      <p:bldP spid="6" grpId="0"/>
+      <p:bldP spid="11" grpId="0"/>
+    </p:bldLst>
+  </p:timing>
+</p:sld>
+</file>
+
+<file path=ppt/slides/slide12.xml><?xml version="1.0" encoding="utf-8"?>
+<p:sld xmlns:a="http://schemas.openxmlformats.org/drawingml/2006/main" xmlns:r="http://schemas.openxmlformats.org/officeDocument/2006/relationships" xmlns:p="http://schemas.openxmlformats.org/presentationml/2006/main">
+  <p:cSld>
+    <p:bg>
+      <p:bgPr>
+        <a:solidFill>
+          <a:schemeClr val="accent3">
+            <a:lumMod val="75000"/>
+          </a:schemeClr>
+        </a:solidFill>
+        <a:effectLst/>
+      </p:bgPr>
+    </p:bg>
+    <p:spTree>
+      <p:nvGrpSpPr>
+        <p:cNvPr id="1" name=""/>
+        <p:cNvGrpSpPr/>
+        <p:nvPr/>
+      </p:nvGrpSpPr>
+      <p:grpSpPr>
+        <a:xfrm>
+          <a:off x="0" y="0"/>
+          <a:ext cx="0" cy="0"/>
+          <a:chOff x="0" y="0"/>
+          <a:chExt cx="0" cy="0"/>
+        </a:xfrm>
+      </p:grpSpPr>
+      <p:pic>
+        <p:nvPicPr>
+          <p:cNvPr id="1026" name="Picture 2" descr="Free Clipart: Question Guy | People"/>
+          <p:cNvPicPr>
+            <a:picLocks noChangeAspect="1" noChangeArrowheads="1"/>
+          </p:cNvPicPr>
+          <p:nvPr/>
+        </p:nvPicPr>
+        <p:blipFill>
+          <a:blip r:embed="rId3" cstate="print"/>
+          <a:srcRect/>
+          <a:stretch>
+            <a:fillRect/>
+          </a:stretch>
+        </p:blipFill>
+        <p:spPr bwMode="auto">
+          <a:xfrm>
+            <a:off x="-1" y="3240558"/>
+            <a:ext cx="1676401" cy="1902942"/>
+          </a:xfrm>
+          <a:prstGeom prst="rect">
+            <a:avLst/>
+          </a:prstGeom>
+          <a:noFill/>
+          <a:effectLst>
+            <a:outerShdw blurRad="76200" dir="18900000" sy="23000" kx="-1200000" algn="bl" rotWithShape="0">
+              <a:prstClr val="black">
+                <a:alpha val="20000"/>
+              </a:prstClr>
+            </a:outerShdw>
+          </a:effectLst>
+        </p:spPr>
+      </p:pic>
+      <p:sp>
+        <p:nvSpPr>
+          <p:cNvPr id="6" name="Rectangle 5"/>
+          <p:cNvSpPr/>
+          <p:nvPr/>
+        </p:nvSpPr>
+        <p:spPr>
+          <a:xfrm>
+            <a:off x="0" y="209550"/>
+            <a:ext cx="9144000" cy="584775"/>
+          </a:xfrm>
+          <a:prstGeom prst="rect">
+            <a:avLst/>
+          </a:prstGeom>
+        </p:spPr>
+        <p:txBody>
+          <a:bodyPr wrap="square">
+            <a:spAutoFit/>
+          </a:bodyPr>
+          <a:lstStyle/>
+          <a:p>
+            <a:pPr algn="ctr"/>
+            <a:r>
+              <a:rPr lang="en-US" sz="3200" dirty="0" smtClean="0">
+                <a:solidFill>
+                  <a:schemeClr val="accent2">
+                    <a:lumMod val="20000"/>
+                    <a:lumOff val="80000"/>
+                  </a:schemeClr>
+                </a:solidFill>
+              </a:rPr>
+              <a:t>Features</a:t>
+            </a:r>
+            <a:endParaRPr lang="en-US" sz="3200" b="1" dirty="0" smtClean="0">
+              <a:solidFill>
+                <a:schemeClr val="accent2">
+                  <a:lumMod val="20000"/>
+                  <a:lumOff val="80000"/>
+                </a:schemeClr>
+              </a:solidFill>
+            </a:endParaRPr>
+          </a:p>
+        </p:txBody>
+      </p:sp>
+      <p:sp>
+        <p:nvSpPr>
+          <p:cNvPr id="11" name="Rectangle 10"/>
+          <p:cNvSpPr/>
+          <p:nvPr/>
+        </p:nvSpPr>
+        <p:spPr>
+          <a:xfrm>
+            <a:off x="838200" y="895350"/>
+            <a:ext cx="8305800" cy="3170099"/>
+          </a:xfrm>
+          <a:prstGeom prst="rect">
+            <a:avLst/>
+          </a:prstGeom>
+        </p:spPr>
+        <p:txBody>
+          <a:bodyPr wrap="square">
+            <a:spAutoFit/>
+          </a:bodyPr>
+          <a:lstStyle/>
+          <a:p>
+            <a:pPr algn="ctr">
+              <a:buFont typeface="Arial" pitchFamily="34" charset="0"/>
+              <a:buChar char="•"/>
+            </a:pPr>
+            <a:r>
+              <a:rPr lang="en-US" sz="5000" dirty="0" smtClean="0">
+                <a:solidFill>
+                  <a:schemeClr val="accent2">
+                    <a:lumMod val="20000"/>
+                    <a:lumOff val="80000"/>
+                  </a:schemeClr>
+                </a:solidFill>
+              </a:rPr>
+              <a:t>Password generator</a:t>
+            </a:r>
+          </a:p>
+          <a:p>
+            <a:pPr algn="ctr">
+              <a:buFont typeface="Arial" pitchFamily="34" charset="0"/>
+              <a:buChar char="•"/>
+            </a:pPr>
+            <a:r>
+              <a:rPr lang="en-US" sz="5000" dirty="0" smtClean="0">
+                <a:solidFill>
+                  <a:schemeClr val="accent2">
+                    <a:lumMod val="20000"/>
+                    <a:lumOff val="80000"/>
+                  </a:schemeClr>
+                </a:solidFill>
+              </a:rPr>
+              <a:t>Responsive design, no need mobile app</a:t>
+            </a:r>
+          </a:p>
+          <a:p>
+            <a:pPr algn="ctr">
+              <a:buFont typeface="Arial" pitchFamily="34" charset="0"/>
+              <a:buChar char="•"/>
+            </a:pPr>
+            <a:r>
+              <a:rPr lang="en-US" sz="5000" dirty="0" smtClean="0">
+                <a:solidFill>
+                  <a:schemeClr val="accent2">
+                    <a:lumMod val="20000"/>
+                    <a:lumOff val="80000"/>
+                  </a:schemeClr>
+                </a:solidFill>
+              </a:rPr>
+              <a:t>Community </a:t>
+            </a:r>
+            <a:r>
+              <a:rPr lang="en-US" sz="5000" dirty="0" err="1" smtClean="0">
+                <a:solidFill>
+                  <a:schemeClr val="accent2">
+                    <a:lumMod val="20000"/>
+                    <a:lumOff val="80000"/>
+                  </a:schemeClr>
+                </a:solidFill>
+              </a:rPr>
+              <a:t>devcenter</a:t>
+            </a:r>
+            <a:endParaRPr lang="en-US" sz="5000" dirty="0" smtClean="0">
+              <a:solidFill>
+                <a:schemeClr val="accent2">
+                  <a:lumMod val="20000"/>
+                  <a:lumOff val="80000"/>
+                </a:schemeClr>
+              </a:solidFill>
+            </a:endParaRPr>
+          </a:p>
+        </p:txBody>
+      </p:sp>
+    </p:spTree>
+  </p:cSld>
+  <p:clrMapOvr>
+    <a:masterClrMapping/>
+  </p:clrMapOvr>
+  <p:transition advClick="0" advTm="6000">
+    <p:wipe dir="r"/>
+  </p:transition>
+  <p:timing>
+    <p:tnLst>
+      <p:par>
+        <p:cTn id="1" dur="indefinite" restart="never" nodeType="tmRoot">
+          <p:childTnLst>
+            <p:seq concurrent="1" nextAc="seek">
+              <p:cTn id="2" dur="indefinite" nodeType="mainSeq">
+                <p:childTnLst>
+                  <p:par>
+                    <p:cTn id="3" fill="hold">
+                      <p:stCondLst>
+                        <p:cond delay="indefinite"/>
+                        <p:cond evt="onBegin" delay="0">
+                          <p:tn val="2"/>
+                        </p:cond>
+                      </p:stCondLst>
+                      <p:childTnLst>
+                        <p:par>
+                          <p:cTn id="4" fill="hold">
+                            <p:stCondLst>
+                              <p:cond delay="0"/>
+                            </p:stCondLst>
+                            <p:childTnLst>
+                              <p:par>
+                                <p:cTn id="5" presetID="1" presetClass="entr" presetSubtype="0" fill="hold" grpId="0" nodeType="afterEffect">
+                                  <p:stCondLst>
+                                    <p:cond delay="0"/>
+                                  </p:stCondLst>
+                                  <p:childTnLst>
+                                    <p:set>
+                                      <p:cBhvr>
+                                        <p:cTn id="6" dur="1" fill="hold">
+                                          <p:stCondLst>
+                                            <p:cond delay="0"/>
+                                          </p:stCondLst>
+                                        </p:cTn>
+                                        <p:tgtEl>
+                                          <p:spTgt spid="6"/>
+                                        </p:tgtEl>
+                                        <p:attrNameLst>
+                                          <p:attrName>style.visibility</p:attrName>
+                                        </p:attrNameLst>
+                                      </p:cBhvr>
+                                      <p:to>
+                                        <p:strVal val="visible"/>
+                                      </p:to>
+                                    </p:set>
+                                  </p:childTnLst>
+                                </p:cTn>
+                              </p:par>
+                            </p:childTnLst>
+                          </p:cTn>
+                        </p:par>
+                        <p:par>
+                          <p:cTn id="7" fill="hold">
+                            <p:stCondLst>
+                              <p:cond delay="0"/>
+                            </p:stCondLst>
+                            <p:childTnLst>
+                              <p:par>
+                                <p:cTn id="8" presetID="1" presetClass="entr" presetSubtype="0" fill="hold" grpId="0" nodeType="afterEffect">
+                                  <p:stCondLst>
+                                    <p:cond delay="500"/>
+                                  </p:stCondLst>
+                                  <p:childTnLst>
+                                    <p:set>
+                                      <p:cBhvr>
+                                        <p:cTn id="9" dur="1" fill="hold">
+                                          <p:stCondLst>
+                                            <p:cond delay="0"/>
+                                          </p:stCondLst>
+                                        </p:cTn>
+                                        <p:tgtEl>
+                                          <p:spTgt spid="11"/>
+                                        </p:tgtEl>
+                                        <p:attrNameLst>
+                                          <p:attrName>style.visibility</p:attrName>
+                                        </p:attrNameLst>
+                                      </p:cBhvr>
+                                      <p:to>
+                                        <p:strVal val="visible"/>
+                                      </p:to>
+                                    </p:set>
+                                  </p:childTnLst>
+                                </p:cTn>
+                              </p:par>
+                            </p:childTnLst>
+                          </p:cTn>
+                        </p:par>
+                      </p:childTnLst>
+                    </p:cTn>
+                  </p:par>
+                </p:childTnLst>
+              </p:cTn>
+              <p:prevCondLst>
+                <p:cond evt="onPrev" delay="0">
+                  <p:tgtEl>
+                    <p:sldTgt/>
+                  </p:tgtEl>
+                </p:cond>
+              </p:prevCondLst>
+              <p:nextCondLst>
+                <p:cond evt="onNext" delay="0">
+                  <p:tgtEl>
+                    <p:sldTgt/>
+                  </p:tgtEl>
+                </p:cond>
+              </p:nextCondLst>
+            </p:seq>
+          </p:childTnLst>
+        </p:cTn>
+      </p:par>
+    </p:tnLst>
+    <p:bldLst>
+      <p:bldP spid="6" grpId="0"/>
+      <p:bldP spid="11" grpId="0"/>
+    </p:bldLst>
+  </p:timing>
+</p:sld>
+</file>
+
+<file path=ppt/slides/slide13.xml><?xml version="1.0" encoding="utf-8"?>
+<p:sld xmlns:a="http://schemas.openxmlformats.org/drawingml/2006/main" xmlns:r="http://schemas.openxmlformats.org/officeDocument/2006/relationships" xmlns:p="http://schemas.openxmlformats.org/presentationml/2006/main">
+  <p:cSld>
+    <p:bg>
+      <p:bgPr>
+        <a:solidFill>
+          <a:schemeClr val="accent3">
+            <a:lumMod val="75000"/>
+          </a:schemeClr>
+        </a:solidFill>
+        <a:effectLst/>
+      </p:bgPr>
+    </p:bg>
+    <p:spTree>
+      <p:nvGrpSpPr>
+        <p:cNvPr id="1" name=""/>
+        <p:cNvGrpSpPr/>
+        <p:nvPr/>
+      </p:nvGrpSpPr>
+      <p:grpSpPr>
+        <a:xfrm>
+          <a:off x="0" y="0"/>
+          <a:ext cx="0" cy="0"/>
+          <a:chOff x="0" y="0"/>
+          <a:chExt cx="0" cy="0"/>
+        </a:xfrm>
+      </p:grpSpPr>
+      <p:pic>
+        <p:nvPicPr>
+          <p:cNvPr id="1026" name="Picture 2" descr="Free Clipart: Question Guy | People"/>
+          <p:cNvPicPr>
+            <a:picLocks noChangeAspect="1" noChangeArrowheads="1"/>
+          </p:cNvPicPr>
+          <p:nvPr/>
+        </p:nvPicPr>
+        <p:blipFill>
+          <a:blip r:embed="rId3" cstate="print"/>
+          <a:srcRect/>
+          <a:stretch>
+            <a:fillRect/>
+          </a:stretch>
+        </p:blipFill>
+        <p:spPr bwMode="auto">
+          <a:xfrm>
+            <a:off x="-1" y="3240558"/>
+            <a:ext cx="1676401" cy="1902942"/>
+          </a:xfrm>
+          <a:prstGeom prst="rect">
+            <a:avLst/>
+          </a:prstGeom>
+          <a:noFill/>
+          <a:effectLst>
+            <a:outerShdw blurRad="76200" dir="18900000" sy="23000" kx="-1200000" algn="bl" rotWithShape="0">
+              <a:prstClr val="black">
+                <a:alpha val="20000"/>
+              </a:prstClr>
+            </a:outerShdw>
+          </a:effectLst>
+        </p:spPr>
+      </p:pic>
+      <p:sp>
+        <p:nvSpPr>
+          <p:cNvPr id="6" name="Rectangle 5"/>
+          <p:cNvSpPr/>
+          <p:nvPr/>
+        </p:nvSpPr>
+        <p:spPr>
+          <a:xfrm>
+            <a:off x="0" y="209550"/>
+            <a:ext cx="9144000" cy="584775"/>
+          </a:xfrm>
+          <a:prstGeom prst="rect">
+            <a:avLst/>
+          </a:prstGeom>
+        </p:spPr>
+        <p:txBody>
+          <a:bodyPr wrap="square">
+            <a:spAutoFit/>
+          </a:bodyPr>
+          <a:lstStyle/>
+          <a:p>
+            <a:pPr algn="ctr"/>
+            <a:r>
+              <a:rPr lang="en-US" sz="3200" dirty="0" smtClean="0">
+                <a:solidFill>
+                  <a:schemeClr val="accent2">
+                    <a:lumMod val="20000"/>
+                    <a:lumOff val="80000"/>
+                  </a:schemeClr>
+                </a:solidFill>
+              </a:rPr>
+              <a:t>Features</a:t>
+            </a:r>
+            <a:endParaRPr lang="en-US" sz="3200" b="1" dirty="0" smtClean="0">
+              <a:solidFill>
+                <a:schemeClr val="accent2">
+                  <a:lumMod val="20000"/>
+                  <a:lumOff val="80000"/>
+                </a:schemeClr>
+              </a:solidFill>
+            </a:endParaRPr>
+          </a:p>
+        </p:txBody>
+      </p:sp>
+      <p:sp>
+        <p:nvSpPr>
+          <p:cNvPr id="11" name="Rectangle 10"/>
+          <p:cNvSpPr/>
+          <p:nvPr/>
+        </p:nvSpPr>
+        <p:spPr>
+          <a:xfrm>
+            <a:off x="838200" y="895350"/>
+            <a:ext cx="8305800" cy="3939540"/>
+          </a:xfrm>
+          <a:prstGeom prst="rect">
+            <a:avLst/>
+          </a:prstGeom>
+        </p:spPr>
+        <p:txBody>
+          <a:bodyPr wrap="square">
+            <a:spAutoFit/>
+          </a:bodyPr>
+          <a:lstStyle/>
+          <a:p>
+            <a:pPr algn="ctr">
+              <a:buFont typeface="Arial" pitchFamily="34" charset="0"/>
+              <a:buChar char="•"/>
+            </a:pPr>
+            <a:r>
+              <a:rPr lang="en-US" sz="5000" dirty="0" smtClean="0">
+                <a:solidFill>
+                  <a:schemeClr val="accent2">
+                    <a:lumMod val="20000"/>
+                    <a:lumOff val="80000"/>
+                  </a:schemeClr>
+                </a:solidFill>
+              </a:rPr>
+              <a:t>Information managing is one side of the coin. Have idea of next generation password system??</a:t>
+            </a:r>
+          </a:p>
+          <a:p>
+            <a:pPr algn="ctr">
+              <a:buFont typeface="Arial" pitchFamily="34" charset="0"/>
+              <a:buChar char="•"/>
+            </a:pPr>
+            <a:r>
+              <a:rPr lang="en-US" sz="5000" dirty="0" smtClean="0">
+                <a:solidFill>
+                  <a:schemeClr val="accent2">
+                    <a:lumMod val="20000"/>
+                    <a:lumOff val="80000"/>
+                  </a:schemeClr>
+                </a:solidFill>
+              </a:rPr>
+              <a:t>Share in </a:t>
+            </a:r>
+            <a:r>
+              <a:rPr lang="en-US" sz="5000" dirty="0" err="1" smtClean="0">
+                <a:solidFill>
+                  <a:schemeClr val="accent2">
+                    <a:lumMod val="20000"/>
+                    <a:lumOff val="80000"/>
+                  </a:schemeClr>
+                </a:solidFill>
+              </a:rPr>
+              <a:t>devcenter</a:t>
+            </a:r>
+            <a:endParaRPr lang="en-US" sz="5000" dirty="0" smtClean="0">
+              <a:solidFill>
+                <a:schemeClr val="accent2">
+                  <a:lumMod val="20000"/>
+                  <a:lumOff val="80000"/>
+                </a:schemeClr>
+              </a:solidFill>
+            </a:endParaRPr>
+          </a:p>
+        </p:txBody>
+      </p:sp>
+    </p:spTree>
+  </p:cSld>
+  <p:clrMapOvr>
+    <a:masterClrMapping/>
+  </p:clrMapOvr>
+  <p:transition advClick="0" advTm="6000">
+    <p:wipe dir="r"/>
+  </p:transition>
+  <p:timing>
+    <p:tnLst>
+      <p:par>
+        <p:cTn id="1" dur="indefinite" restart="never" nodeType="tmRoot">
+          <p:childTnLst>
+            <p:seq concurrent="1" nextAc="seek">
+              <p:cTn id="2" dur="indefinite" nodeType="mainSeq">
+                <p:childTnLst>
+                  <p:par>
+                    <p:cTn id="3" fill="hold">
+                      <p:stCondLst>
+                        <p:cond delay="indefinite"/>
+                        <p:cond evt="onBegin" delay="0">
+                          <p:tn val="2"/>
+                        </p:cond>
+                      </p:stCondLst>
+                      <p:childTnLst>
+                        <p:par>
+                          <p:cTn id="4" fill="hold">
+                            <p:stCondLst>
+                              <p:cond delay="0"/>
+                            </p:stCondLst>
+                            <p:childTnLst>
+                              <p:par>
+                                <p:cTn id="5" presetID="1" presetClass="entr" presetSubtype="0" fill="hold" grpId="0" nodeType="afterEffect">
+                                  <p:stCondLst>
+                                    <p:cond delay="0"/>
+                                  </p:stCondLst>
+                                  <p:childTnLst>
+                                    <p:set>
+                                      <p:cBhvr>
+                                        <p:cTn id="6" dur="1" fill="hold">
+                                          <p:stCondLst>
+                                            <p:cond delay="0"/>
+                                          </p:stCondLst>
+                                        </p:cTn>
+                                        <p:tgtEl>
+                                          <p:spTgt spid="6"/>
+                                        </p:tgtEl>
+                                        <p:attrNameLst>
+                                          <p:attrName>style.visibility</p:attrName>
+                                        </p:attrNameLst>
+                                      </p:cBhvr>
+                                      <p:to>
+                                        <p:strVal val="visible"/>
+                                      </p:to>
+                                    </p:set>
+                                  </p:childTnLst>
+                                </p:cTn>
+                              </p:par>
+                            </p:childTnLst>
+                          </p:cTn>
+                        </p:par>
+                        <p:par>
+                          <p:cTn id="7" fill="hold">
+                            <p:stCondLst>
+                              <p:cond delay="0"/>
+                            </p:stCondLst>
+                            <p:childTnLst>
+                              <p:par>
+                                <p:cTn id="8" presetID="1" presetClass="entr" presetSubtype="0" fill="hold" grpId="0" nodeType="afterEffect">
+                                  <p:stCondLst>
+                                    <p:cond delay="500"/>
+                                  </p:stCondLst>
+                                  <p:childTnLst>
+                                    <p:set>
+                                      <p:cBhvr>
+                                        <p:cTn id="9" dur="1" fill="hold">
+                                          <p:stCondLst>
+                                            <p:cond delay="0"/>
+                                          </p:stCondLst>
+                                        </p:cTn>
+                                        <p:tgtEl>
+                                          <p:spTgt spid="11"/>
+                                        </p:tgtEl>
+                                        <p:attrNameLst>
+                                          <p:attrName>style.visibility</p:attrName>
+                                        </p:attrNameLst>
+                                      </p:cBhvr>
+                                      <p:to>
+                                        <p:strVal val="visible"/>
+                                      </p:to>
+                                    </p:set>
+                                  </p:childTnLst>
+                                </p:cTn>
+                              </p:par>
+                            </p:childTnLst>
+                          </p:cTn>
+                        </p:par>
+                      </p:childTnLst>
+                    </p:cTn>
+                  </p:par>
+                </p:childTnLst>
+              </p:cTn>
+              <p:prevCondLst>
+                <p:cond evt="onPrev" delay="0">
+                  <p:tgtEl>
+                    <p:sldTgt/>
+                  </p:tgtEl>
+                </p:cond>
+              </p:prevCondLst>
+              <p:nextCondLst>
+                <p:cond evt="onNext" delay="0">
+                  <p:tgtEl>
+                    <p:sldTgt/>
+                  </p:tgtEl>
+                </p:cond>
+              </p:nextCondLst>
+            </p:seq>
+          </p:childTnLst>
+        </p:cTn>
+      </p:par>
+    </p:tnLst>
+    <p:bldLst>
+      <p:bldP spid="6" grpId="0"/>
+      <p:bldP spid="11" grpId="0"/>
+    </p:bldLst>
   </p:timing>
 </p:sld>
 </file>
@@ -5224,425 +6479,6 @@
       </p:pic>
       <p:sp>
         <p:nvSpPr>
-          <p:cNvPr id="4" name="Rounded Rectangle 3"/>
-          <p:cNvSpPr/>
-          <p:nvPr/>
-        </p:nvSpPr>
-        <p:spPr>
-          <a:xfrm>
-            <a:off x="4267200" y="1581150"/>
-            <a:ext cx="3505200" cy="2667000"/>
-          </a:xfrm>
-          <a:prstGeom prst="roundRect">
-            <a:avLst>
-              <a:gd name="adj" fmla="val 5029"/>
-            </a:avLst>
-          </a:prstGeom>
-          <a:ln>
-            <a:noFill/>
-          </a:ln>
-          <a:effectLst>
-            <a:outerShdw blurRad="76200" dir="18900000" sy="23000" kx="-1200000" algn="bl" rotWithShape="0">
-              <a:prstClr val="black">
-                <a:alpha val="16000"/>
-              </a:prstClr>
-            </a:outerShdw>
-          </a:effectLst>
-        </p:spPr>
-        <p:style>
-          <a:lnRef idx="1">
-            <a:schemeClr val="accent4"/>
-          </a:lnRef>
-          <a:fillRef idx="2">
-            <a:schemeClr val="accent4"/>
-          </a:fillRef>
-          <a:effectRef idx="1">
-            <a:schemeClr val="accent4"/>
-          </a:effectRef>
-          <a:fontRef idx="minor">
-            <a:schemeClr val="dk1"/>
-          </a:fontRef>
-        </p:style>
-        <p:txBody>
-          <a:bodyPr rtlCol="0" anchor="ctr"/>
-          <a:lstStyle/>
-          <a:p>
-            <a:pPr algn="ctr"/>
-            <a:r>
-              <a:rPr lang="en-US" dirty="0" smtClean="0"/>
-              <a:t>We have to use </a:t>
-            </a:r>
-            <a:endParaRPr lang="en-US" b="1" dirty="0" smtClean="0"/>
-          </a:p>
-          <a:p>
-            <a:pPr algn="ctr"/>
-            <a:r>
-              <a:rPr lang="en-US" sz="3200" b="1" dirty="0" smtClean="0"/>
-              <a:t>Passwords</a:t>
-            </a:r>
-          </a:p>
-          <a:p>
-            <a:pPr algn="ctr"/>
-            <a:r>
-              <a:rPr lang="en-US" sz="2800" b="1" dirty="0" smtClean="0"/>
-              <a:t>PIN Codes</a:t>
-            </a:r>
-          </a:p>
-          <a:p>
-            <a:pPr algn="ctr"/>
-            <a:r>
-              <a:rPr lang="en-US" sz="2400" b="1" dirty="0" smtClean="0"/>
-              <a:t>ID Numbers </a:t>
-            </a:r>
-          </a:p>
-          <a:p>
-            <a:pPr algn="ctr"/>
-            <a:r>
-              <a:rPr lang="en-US" dirty="0" smtClean="0"/>
-              <a:t>everywhere</a:t>
-            </a:r>
-            <a:endParaRPr lang="en-US" dirty="0"/>
-          </a:p>
-        </p:txBody>
-      </p:sp>
-      <p:sp>
-        <p:nvSpPr>
-          <p:cNvPr id="8" name="Rectangle 7"/>
-          <p:cNvSpPr/>
-          <p:nvPr/>
-        </p:nvSpPr>
-        <p:spPr>
-          <a:xfrm>
-            <a:off x="5362312" y="3506932"/>
-            <a:ext cx="1319336" cy="369332"/>
-          </a:xfrm>
-          <a:prstGeom prst="rect">
-            <a:avLst/>
-          </a:prstGeom>
-        </p:spPr>
-        <p:txBody>
-          <a:bodyPr wrap="none">
-            <a:spAutoFit/>
-          </a:bodyPr>
-          <a:lstStyle/>
-          <a:p>
-            <a:pPr algn="ctr"/>
-            <a:r>
-              <a:rPr lang="en-US" b="1" dirty="0" smtClean="0">
-                <a:solidFill>
-                  <a:sysClr val="windowText" lastClr="000000"/>
-                </a:solidFill>
-              </a:rPr>
-              <a:t>e</a:t>
-            </a:r>
-            <a:r>
-              <a:rPr lang="en-US" b="1" dirty="0" smtClean="0">
-                <a:solidFill>
-                  <a:sysClr val="windowText" lastClr="000000"/>
-                </a:solidFill>
-              </a:rPr>
-              <a:t>verywhere</a:t>
-            </a:r>
-            <a:endParaRPr lang="en-US" b="1" dirty="0">
-              <a:solidFill>
-                <a:sysClr val="windowText" lastClr="000000"/>
-              </a:solidFill>
-            </a:endParaRPr>
-          </a:p>
-        </p:txBody>
-      </p:sp>
-      <p:sp>
-        <p:nvSpPr>
-          <p:cNvPr id="9" name="Rectangle 8"/>
-          <p:cNvSpPr/>
-          <p:nvPr/>
-        </p:nvSpPr>
-        <p:spPr>
-          <a:xfrm>
-            <a:off x="1676400" y="361950"/>
-            <a:ext cx="2233945" cy="369332"/>
-          </a:xfrm>
-          <a:prstGeom prst="rect">
-            <a:avLst/>
-          </a:prstGeom>
-        </p:spPr>
-        <p:txBody>
-          <a:bodyPr wrap="none">
-            <a:spAutoFit/>
-          </a:bodyPr>
-          <a:lstStyle/>
-          <a:p>
-            <a:r>
-              <a:rPr lang="en-US" b="1" dirty="0" smtClean="0">
-                <a:solidFill>
-                  <a:schemeClr val="bg1"/>
-                </a:solidFill>
-              </a:rPr>
-              <a:t> means… where not…</a:t>
-            </a:r>
-            <a:endParaRPr lang="en-US" dirty="0"/>
-          </a:p>
-        </p:txBody>
-      </p:sp>
-    </p:spTree>
-  </p:cSld>
-  <p:clrMapOvr>
-    <a:masterClrMapping/>
-  </p:clrMapOvr>
-  <p:transition advClick="0" advTm="6000">
-    <p:wipe dir="r"/>
-  </p:transition>
-  <p:timing>
-    <p:tnLst>
-      <p:par>
-        <p:cTn id="1" dur="indefinite" restart="never" nodeType="tmRoot">
-          <p:childTnLst>
-            <p:seq concurrent="1" nextAc="seek">
-              <p:cTn id="2" dur="indefinite" nodeType="mainSeq">
-                <p:childTnLst>
-                  <p:par>
-                    <p:cTn id="3" fill="hold">
-                      <p:stCondLst>
-                        <p:cond delay="indefinite"/>
-                        <p:cond evt="onBegin" delay="0">
-                          <p:tn val="2"/>
-                        </p:cond>
-                      </p:stCondLst>
-                      <p:childTnLst>
-                        <p:par>
-                          <p:cTn id="4" fill="hold">
-                            <p:stCondLst>
-                              <p:cond delay="0"/>
-                            </p:stCondLst>
-                            <p:childTnLst>
-                              <p:par>
-                                <p:cTn id="5" presetID="12" presetClass="entr" presetSubtype="4" fill="hold" grpId="1" nodeType="afterEffect">
-                                  <p:stCondLst>
-                                    <p:cond delay="0"/>
-                                  </p:stCondLst>
-                                  <p:childTnLst>
-                                    <p:set>
-                                      <p:cBhvr>
-                                        <p:cTn id="6" dur="1" fill="hold">
-                                          <p:stCondLst>
-                                            <p:cond delay="0"/>
-                                          </p:stCondLst>
-                                        </p:cTn>
-                                        <p:tgtEl>
-                                          <p:spTgt spid="4"/>
-                                        </p:tgtEl>
-                                        <p:attrNameLst>
-                                          <p:attrName>style.visibility</p:attrName>
-                                        </p:attrNameLst>
-                                      </p:cBhvr>
-                                      <p:to>
-                                        <p:strVal val="visible"/>
-                                      </p:to>
-                                    </p:set>
-                                    <p:animEffect transition="in" filter="slide(fromBottom)">
-                                      <p:cBhvr>
-                                        <p:cTn id="7" dur="500"/>
-                                        <p:tgtEl>
-                                          <p:spTgt spid="4"/>
-                                        </p:tgtEl>
-                                      </p:cBhvr>
-                                    </p:animEffect>
-                                  </p:childTnLst>
-                                </p:cTn>
-                              </p:par>
-                            </p:childTnLst>
-                          </p:cTn>
-                        </p:par>
-                        <p:par>
-                          <p:cTn id="8" fill="hold">
-                            <p:stCondLst>
-                              <p:cond delay="500"/>
-                            </p:stCondLst>
-                            <p:childTnLst>
-                              <p:par>
-                                <p:cTn id="9" presetID="1" presetClass="entr" presetSubtype="0" fill="hold" grpId="1" nodeType="afterEffect">
-                                  <p:stCondLst>
-                                    <p:cond delay="0"/>
-                                  </p:stCondLst>
-                                  <p:childTnLst>
-                                    <p:set>
-                                      <p:cBhvr>
-                                        <p:cTn id="10" dur="1" fill="hold">
-                                          <p:stCondLst>
-                                            <p:cond delay="0"/>
-                                          </p:stCondLst>
-                                        </p:cTn>
-                                        <p:tgtEl>
-                                          <p:spTgt spid="8"/>
-                                        </p:tgtEl>
-                                        <p:attrNameLst>
-                                          <p:attrName>style.visibility</p:attrName>
-                                        </p:attrNameLst>
-                                      </p:cBhvr>
-                                      <p:to>
-                                        <p:strVal val="visible"/>
-                                      </p:to>
-                                    </p:set>
-                                  </p:childTnLst>
-                                </p:cTn>
-                              </p:par>
-                              <p:par>
-                                <p:cTn id="11" presetID="49" presetClass="path" presetSubtype="0" accel="50000" decel="50000" fill="hold" grpId="0" nodeType="withEffect">
-                                  <p:stCondLst>
-                                    <p:cond delay="2500"/>
-                                  </p:stCondLst>
-                                  <p:childTnLst>
-                                    <p:animMotion origin="layout" path="M -0.06823 -0.01018 L -0.52657 -0.66203 " pathEditMode="relative" rAng="0" ptsTypes="AA">
-                                      <p:cBhvr>
-                                        <p:cTn id="12" dur="500" fill="hold"/>
-                                        <p:tgtEl>
-                                          <p:spTgt spid="8"/>
-                                        </p:tgtEl>
-                                        <p:attrNameLst>
-                                          <p:attrName>ppt_x</p:attrName>
-                                          <p:attrName>ppt_y</p:attrName>
-                                        </p:attrNameLst>
-                                      </p:cBhvr>
-                                      <p:rCtr x="-229" y="-326"/>
-                                    </p:animMotion>
-                                  </p:childTnLst>
-                                </p:cTn>
-                              </p:par>
-                            </p:childTnLst>
-                          </p:cTn>
-                        </p:par>
-                        <p:par>
-                          <p:cTn id="13" fill="hold">
-                            <p:stCondLst>
-                              <p:cond delay="3500"/>
-                            </p:stCondLst>
-                            <p:childTnLst>
-                              <p:par>
-                                <p:cTn id="14" presetID="1" presetClass="entr" presetSubtype="0" fill="hold" grpId="0" nodeType="afterEffect">
-                                  <p:stCondLst>
-                                    <p:cond delay="0"/>
-                                  </p:stCondLst>
-                                  <p:childTnLst>
-                                    <p:set>
-                                      <p:cBhvr>
-                                        <p:cTn id="15" dur="1" fill="hold">
-                                          <p:stCondLst>
-                                            <p:cond delay="0"/>
-                                          </p:stCondLst>
-                                        </p:cTn>
-                                        <p:tgtEl>
-                                          <p:spTgt spid="9"/>
-                                        </p:tgtEl>
-                                        <p:attrNameLst>
-                                          <p:attrName>style.visibility</p:attrName>
-                                        </p:attrNameLst>
-                                      </p:cBhvr>
-                                      <p:to>
-                                        <p:strVal val="visible"/>
-                                      </p:to>
-                                    </p:set>
-                                  </p:childTnLst>
-                                </p:cTn>
-                              </p:par>
-                            </p:childTnLst>
-                          </p:cTn>
-                        </p:par>
-                      </p:childTnLst>
-                    </p:cTn>
-                  </p:par>
-                </p:childTnLst>
-              </p:cTn>
-              <p:prevCondLst>
-                <p:cond evt="onPrev" delay="0">
-                  <p:tgtEl>
-                    <p:sldTgt/>
-                  </p:tgtEl>
-                </p:cond>
-              </p:prevCondLst>
-              <p:nextCondLst>
-                <p:cond evt="onNext" delay="0">
-                  <p:tgtEl>
-                    <p:sldTgt/>
-                  </p:tgtEl>
-                </p:cond>
-              </p:nextCondLst>
-            </p:seq>
-          </p:childTnLst>
-        </p:cTn>
-      </p:par>
-    </p:tnLst>
-    <p:bldLst>
-      <p:bldP spid="4" grpId="1" animBg="1"/>
-      <p:bldP spid="8" grpId="0"/>
-      <p:bldP spid="8" grpId="1"/>
-      <p:bldP spid="9" grpId="0"/>
-    </p:bldLst>
-  </p:timing>
-</p:sld>
-</file>
-
-<file path=ppt/slides/slide4.xml><?xml version="1.0" encoding="utf-8"?>
-<p:sld xmlns:a="http://schemas.openxmlformats.org/drawingml/2006/main" xmlns:r="http://schemas.openxmlformats.org/officeDocument/2006/relationships" xmlns:p="http://schemas.openxmlformats.org/presentationml/2006/main">
-  <p:cSld>
-    <p:bg>
-      <p:bgPr>
-        <a:solidFill>
-          <a:schemeClr val="accent3">
-            <a:lumMod val="75000"/>
-          </a:schemeClr>
-        </a:solidFill>
-        <a:effectLst/>
-      </p:bgPr>
-    </p:bg>
-    <p:spTree>
-      <p:nvGrpSpPr>
-        <p:cNvPr id="1" name=""/>
-        <p:cNvGrpSpPr/>
-        <p:nvPr/>
-      </p:nvGrpSpPr>
-      <p:grpSpPr>
-        <a:xfrm>
-          <a:off x="0" y="0"/>
-          <a:ext cx="0" cy="0"/>
-          <a:chOff x="0" y="0"/>
-          <a:chExt cx="0" cy="0"/>
-        </a:xfrm>
-      </p:grpSpPr>
-      <p:pic>
-        <p:nvPicPr>
-          <p:cNvPr id="1026" name="Picture 2" descr="Free Clipart: Question Guy | People"/>
-          <p:cNvPicPr>
-            <a:picLocks noChangeAspect="1" noChangeArrowheads="1"/>
-          </p:cNvPicPr>
-          <p:nvPr/>
-        </p:nvPicPr>
-        <p:blipFill>
-          <a:blip r:embed="rId3"/>
-          <a:srcRect/>
-          <a:stretch>
-            <a:fillRect/>
-          </a:stretch>
-        </p:blipFill>
-        <p:spPr bwMode="auto">
-          <a:xfrm>
-            <a:off x="-1" y="971550"/>
-            <a:ext cx="3675289" cy="4171950"/>
-          </a:xfrm>
-          <a:prstGeom prst="rect">
-            <a:avLst/>
-          </a:prstGeom>
-          <a:noFill/>
-          <a:effectLst>
-            <a:outerShdw blurRad="76200" dir="18900000" sy="23000" kx="-1200000" algn="bl" rotWithShape="0">
-              <a:prstClr val="black">
-                <a:alpha val="20000"/>
-              </a:prstClr>
-            </a:outerShdw>
-          </a:effectLst>
-        </p:spPr>
-      </p:pic>
-      <p:sp>
-        <p:nvSpPr>
           <p:cNvPr id="6" name="Rectangle 5"/>
           <p:cNvSpPr/>
           <p:nvPr/>
@@ -5718,14 +6554,6 @@
               </a:rPr>
               <a:t>Passwords</a:t>
             </a:r>
-            <a:endParaRPr lang="en-US" sz="7000" b="1" dirty="0" smtClean="0">
-              <a:solidFill>
-                <a:schemeClr val="accent2">
-                  <a:lumMod val="20000"/>
-                  <a:lumOff val="80000"/>
-                </a:schemeClr>
-              </a:solidFill>
-            </a:endParaRPr>
           </a:p>
         </p:txBody>
       </p:sp>
@@ -5762,14 +6590,6 @@
               </a:rPr>
               <a:t>PIN Codes</a:t>
             </a:r>
-            <a:endParaRPr lang="en-US" sz="5000" b="1" dirty="0" smtClean="0">
-              <a:solidFill>
-                <a:schemeClr val="accent2">
-                  <a:lumMod val="20000"/>
-                  <a:lumOff val="80000"/>
-                </a:schemeClr>
-              </a:solidFill>
-            </a:endParaRPr>
           </a:p>
         </p:txBody>
       </p:sp>
@@ -5806,14 +6626,6 @@
               </a:rPr>
               <a:t>ID Numbers </a:t>
             </a:r>
-            <a:endParaRPr lang="en-US" sz="5000" b="1" dirty="0" smtClean="0">
-              <a:solidFill>
-                <a:schemeClr val="accent2">
-                  <a:lumMod val="20000"/>
-                  <a:lumOff val="80000"/>
-                </a:schemeClr>
-              </a:solidFill>
-            </a:endParaRPr>
           </a:p>
         </p:txBody>
       </p:sp>
@@ -6101,7 +6913,7 @@
 </p:sld>
 </file>
 
-<file path=ppt/slides/slide5.xml><?xml version="1.0" encoding="utf-8"?>
+<file path=ppt/slides/slide4.xml><?xml version="1.0" encoding="utf-8"?>
 <p:sld xmlns:a="http://schemas.openxmlformats.org/drawingml/2006/main" xmlns:r="http://schemas.openxmlformats.org/officeDocument/2006/relationships" xmlns:p="http://schemas.openxmlformats.org/presentationml/2006/main">
   <p:cSld>
     <p:spTree>
@@ -6349,7 +7161,7 @@
 </p:sld>
 </file>
 
-<file path=ppt/slides/slide6.xml><?xml version="1.0" encoding="utf-8"?>
+<file path=ppt/slides/slide5.xml><?xml version="1.0" encoding="utf-8"?>
 <p:sld xmlns:a="http://schemas.openxmlformats.org/drawingml/2006/main" xmlns:r="http://schemas.openxmlformats.org/officeDocument/2006/relationships" xmlns:p="http://schemas.openxmlformats.org/presentationml/2006/main">
   <p:cSld>
     <p:bg>
@@ -6499,14 +7311,6 @@
               </a:rPr>
               <a:t>On top of that we have to manage very sensitive </a:t>
             </a:r>
-            <a:endParaRPr lang="en-US" sz="3000" b="1" dirty="0" smtClean="0">
-              <a:solidFill>
-                <a:schemeClr val="accent2">
-                  <a:lumMod val="20000"/>
-                  <a:lumOff val="80000"/>
-                </a:schemeClr>
-              </a:solidFill>
-            </a:endParaRPr>
           </a:p>
         </p:txBody>
       </p:sp>
@@ -6731,7 +7535,7 @@
 </p:sld>
 </file>
 
-<file path=ppt/slides/slide7.xml><?xml version="1.0" encoding="utf-8"?>
+<file path=ppt/slides/slide6.xml><?xml version="1.0" encoding="utf-8"?>
 <p:sld xmlns:a="http://schemas.openxmlformats.org/drawingml/2006/main" xmlns:r="http://schemas.openxmlformats.org/officeDocument/2006/relationships" xmlns:p="http://schemas.openxmlformats.org/presentationml/2006/main">
   <p:cSld>
     <p:bg>
@@ -6896,7 +7700,7 @@
 </p:sld>
 </file>
 
-<file path=ppt/slides/slide8.xml><?xml version="1.0" encoding="utf-8"?>
+<file path=ppt/slides/slide7.xml><?xml version="1.0" encoding="utf-8"?>
 <p:sld xmlns:a="http://schemas.openxmlformats.org/drawingml/2006/main" xmlns:r="http://schemas.openxmlformats.org/officeDocument/2006/relationships" xmlns:p="http://schemas.openxmlformats.org/presentationml/2006/main">
   <p:cSld>
     <p:bg>
@@ -7247,7 +8051,7 @@
 </p:sld>
 </file>
 
-<file path=ppt/slides/slide9.xml><?xml version="1.0" encoding="utf-8"?>
+<file path=ppt/slides/slide8.xml><?xml version="1.0" encoding="utf-8"?>
 <p:sld xmlns:a="http://schemas.openxmlformats.org/drawingml/2006/main" xmlns:r="http://schemas.openxmlformats.org/officeDocument/2006/relationships" xmlns:p="http://schemas.openxmlformats.org/presentationml/2006/main">
   <p:cSld>
     <p:bg>
@@ -7599,6 +8403,352 @@
                                         </p:cTn>
                                         <p:tgtEl>
                                           <p:spTgt spid="7"/>
+                                        </p:tgtEl>
+                                        <p:attrNameLst>
+                                          <p:attrName>style.visibility</p:attrName>
+                                        </p:attrNameLst>
+                                      </p:cBhvr>
+                                      <p:to>
+                                        <p:strVal val="visible"/>
+                                      </p:to>
+                                    </p:set>
+                                  </p:childTnLst>
+                                </p:cTn>
+                              </p:par>
+                            </p:childTnLst>
+                          </p:cTn>
+                        </p:par>
+                      </p:childTnLst>
+                    </p:cTn>
+                  </p:par>
+                </p:childTnLst>
+              </p:cTn>
+              <p:prevCondLst>
+                <p:cond evt="onPrev" delay="0">
+                  <p:tgtEl>
+                    <p:sldTgt/>
+                  </p:tgtEl>
+                </p:cond>
+              </p:prevCondLst>
+              <p:nextCondLst>
+                <p:cond evt="onNext" delay="0">
+                  <p:tgtEl>
+                    <p:sldTgt/>
+                  </p:tgtEl>
+                </p:cond>
+              </p:nextCondLst>
+            </p:seq>
+          </p:childTnLst>
+        </p:cTn>
+      </p:par>
+    </p:tnLst>
+  </p:timing>
+</p:sld>
+</file>
+
+<file path=ppt/slides/slide9.xml><?xml version="1.0" encoding="utf-8"?>
+<p:sld xmlns:a="http://schemas.openxmlformats.org/drawingml/2006/main" xmlns:r="http://schemas.openxmlformats.org/officeDocument/2006/relationships" xmlns:p="http://schemas.openxmlformats.org/presentationml/2006/main">
+  <p:cSld>
+    <p:bg>
+      <p:bgPr>
+        <a:solidFill>
+          <a:schemeClr val="bg1"/>
+        </a:solidFill>
+        <a:effectLst/>
+      </p:bgPr>
+    </p:bg>
+    <p:spTree>
+      <p:nvGrpSpPr>
+        <p:cNvPr id="1" name=""/>
+        <p:cNvGrpSpPr/>
+        <p:nvPr/>
+      </p:nvGrpSpPr>
+      <p:grpSpPr>
+        <a:xfrm>
+          <a:off x="0" y="0"/>
+          <a:ext cx="0" cy="0"/>
+          <a:chOff x="0" y="0"/>
+          <a:chExt cx="0" cy="0"/>
+        </a:xfrm>
+      </p:grpSpPr>
+      <p:sp>
+        <p:nvSpPr>
+          <p:cNvPr id="4" name="Rounded Rectangle 3"/>
+          <p:cNvSpPr/>
+          <p:nvPr/>
+        </p:nvSpPr>
+        <p:spPr>
+          <a:xfrm>
+            <a:off x="3733800" y="819150"/>
+            <a:ext cx="4191000" cy="3733800"/>
+          </a:xfrm>
+          <a:prstGeom prst="roundRect">
+            <a:avLst>
+              <a:gd name="adj" fmla="val 5029"/>
+            </a:avLst>
+          </a:prstGeom>
+          <a:ln>
+            <a:noFill/>
+          </a:ln>
+          <a:effectLst>
+            <a:outerShdw blurRad="76200" dir="18900000" sy="23000" kx="-1200000" algn="bl" rotWithShape="0">
+              <a:prstClr val="black">
+                <a:alpha val="16000"/>
+              </a:prstClr>
+            </a:outerShdw>
+          </a:effectLst>
+        </p:spPr>
+        <p:style>
+          <a:lnRef idx="1">
+            <a:schemeClr val="accent4"/>
+          </a:lnRef>
+          <a:fillRef idx="2">
+            <a:schemeClr val="accent4"/>
+          </a:fillRef>
+          <a:effectRef idx="1">
+            <a:schemeClr val="accent4"/>
+          </a:effectRef>
+          <a:fontRef idx="minor">
+            <a:schemeClr val="dk1"/>
+          </a:fontRef>
+        </p:style>
+        <p:txBody>
+          <a:bodyPr rtlCol="0" anchor="ctr"/>
+          <a:lstStyle/>
+          <a:p>
+            <a:pPr algn="ctr"/>
+            <a:r>
+              <a:rPr lang="en-US" sz="4000" b="1" dirty="0" smtClean="0">
+                <a:solidFill>
+                  <a:schemeClr val="tx1"/>
+                </a:solidFill>
+              </a:rPr>
+              <a:t>Using </a:t>
+            </a:r>
+          </a:p>
+          <a:p>
+            <a:pPr algn="ctr"/>
+            <a:r>
+              <a:rPr lang="en-US" sz="8000" b="1" dirty="0" smtClean="0">
+                <a:solidFill>
+                  <a:schemeClr val="accent1"/>
+                </a:solidFill>
+              </a:rPr>
+              <a:t>Word Excel </a:t>
+            </a:r>
+            <a:endParaRPr lang="en-US" sz="4000" b="1" dirty="0">
+              <a:solidFill>
+                <a:schemeClr val="tx1"/>
+              </a:solidFill>
+            </a:endParaRPr>
+          </a:p>
+          <a:p>
+            <a:pPr algn="ctr"/>
+            <a:r>
+              <a:rPr lang="en-US" sz="4000" b="1" dirty="0" smtClean="0">
+                <a:solidFill>
+                  <a:schemeClr val="tx1"/>
+                </a:solidFill>
+              </a:rPr>
+              <a:t>to save? </a:t>
+            </a:r>
+            <a:endParaRPr lang="en-US" sz="4000" b="1" dirty="0">
+              <a:solidFill>
+                <a:schemeClr val="accent1"/>
+              </a:solidFill>
+            </a:endParaRPr>
+          </a:p>
+        </p:txBody>
+      </p:sp>
+      <p:pic>
+        <p:nvPicPr>
+          <p:cNvPr id="1026" name="Picture 2" descr="Free Clipart: Question Guy | People"/>
+          <p:cNvPicPr>
+            <a:picLocks noChangeAspect="1" noChangeArrowheads="1"/>
+          </p:cNvPicPr>
+          <p:nvPr/>
+        </p:nvPicPr>
+        <p:blipFill>
+          <a:blip r:embed="rId3"/>
+          <a:srcRect/>
+          <a:stretch>
+            <a:fillRect/>
+          </a:stretch>
+        </p:blipFill>
+        <p:spPr bwMode="auto">
+          <a:xfrm>
+            <a:off x="-1" y="971550"/>
+            <a:ext cx="3675289" cy="4171950"/>
+          </a:xfrm>
+          <a:prstGeom prst="rect">
+            <a:avLst/>
+          </a:prstGeom>
+          <a:noFill/>
+          <a:effectLst>
+            <a:outerShdw blurRad="76200" dir="18900000" sy="23000" kx="-1200000" algn="bl" rotWithShape="0">
+              <a:prstClr val="black">
+                <a:alpha val="20000"/>
+              </a:prstClr>
+            </a:outerShdw>
+          </a:effectLst>
+        </p:spPr>
+      </p:pic>
+      <p:grpSp>
+        <p:nvGrpSpPr>
+          <p:cNvPr id="2" name="Group 6"/>
+          <p:cNvGrpSpPr/>
+          <p:nvPr/>
+        </p:nvGrpSpPr>
+        <p:grpSpPr>
+          <a:xfrm>
+            <a:off x="3581400" y="133350"/>
+            <a:ext cx="4572000" cy="4876800"/>
+            <a:chOff x="3581400" y="133350"/>
+            <a:chExt cx="4572000" cy="4876800"/>
+          </a:xfrm>
+        </p:grpSpPr>
+        <p:sp>
+          <p:nvSpPr>
+            <p:cNvPr id="5" name="&quot;No&quot; Symbol 4"/>
+            <p:cNvSpPr/>
+            <p:nvPr/>
+          </p:nvSpPr>
+          <p:spPr>
+            <a:xfrm>
+              <a:off x="3581400" y="133350"/>
+              <a:ext cx="4572000" cy="4876800"/>
+            </a:xfrm>
+            <a:prstGeom prst="noSmoking">
+              <a:avLst>
+                <a:gd name="adj" fmla="val 12353"/>
+              </a:avLst>
+            </a:prstGeom>
+            <a:solidFill>
+              <a:srgbClr val="FF0000">
+                <a:alpha val="76000"/>
+              </a:srgbClr>
+            </a:solidFill>
+          </p:spPr>
+          <p:style>
+            <a:lnRef idx="2">
+              <a:schemeClr val="accent1">
+                <a:shade val="50000"/>
+              </a:schemeClr>
+            </a:lnRef>
+            <a:fillRef idx="1">
+              <a:schemeClr val="accent1"/>
+            </a:fillRef>
+            <a:effectRef idx="0">
+              <a:schemeClr val="accent1"/>
+            </a:effectRef>
+            <a:fontRef idx="minor">
+              <a:schemeClr val="lt1"/>
+            </a:fontRef>
+          </p:style>
+          <p:txBody>
+            <a:bodyPr rtlCol="0" anchor="ctr"/>
+            <a:lstStyle/>
+            <a:p>
+              <a:pPr algn="ctr"/>
+              <a:endParaRPr lang="en-US">
+                <a:solidFill>
+                  <a:schemeClr val="tx1"/>
+                </a:solidFill>
+              </a:endParaRPr>
+            </a:p>
+          </p:txBody>
+        </p:sp>
+        <p:sp>
+          <p:nvSpPr>
+            <p:cNvPr id="6" name="TextBox 5"/>
+            <p:cNvSpPr txBox="1"/>
+            <p:nvPr/>
+          </p:nvSpPr>
+          <p:spPr>
+            <a:xfrm>
+              <a:off x="3820391" y="4050723"/>
+              <a:ext cx="4038600" cy="953453"/>
+            </a:xfrm>
+            <a:prstGeom prst="roundRect">
+              <a:avLst/>
+            </a:prstGeom>
+            <a:ln>
+              <a:noFill/>
+            </a:ln>
+          </p:spPr>
+          <p:style>
+            <a:lnRef idx="1">
+              <a:schemeClr val="accent2"/>
+            </a:lnRef>
+            <a:fillRef idx="3">
+              <a:schemeClr val="accent2"/>
+            </a:fillRef>
+            <a:effectRef idx="2">
+              <a:schemeClr val="accent2"/>
+            </a:effectRef>
+            <a:fontRef idx="minor">
+              <a:schemeClr val="lt1"/>
+            </a:fontRef>
+          </p:style>
+          <p:txBody>
+            <a:bodyPr wrap="square" rtlCol="0">
+              <a:spAutoFit/>
+            </a:bodyPr>
+            <a:lstStyle/>
+            <a:p>
+              <a:pPr algn="ctr"/>
+              <a:r>
+                <a:rPr lang="en-US" sz="5000" b="1" dirty="0" smtClean="0"/>
+                <a:t>Wrong</a:t>
+              </a:r>
+              <a:endParaRPr lang="en-US" sz="5000" b="1" dirty="0"/>
+            </a:p>
+          </p:txBody>
+        </p:sp>
+      </p:grpSp>
+    </p:spTree>
+  </p:cSld>
+  <p:clrMapOvr>
+    <a:masterClrMapping/>
+  </p:clrMapOvr>
+  <p:transition advTm="3000">
+    <p:pull/>
+  </p:transition>
+  <p:timing>
+    <p:tnLst>
+      <p:par>
+        <p:cTn id="1" dur="indefinite" restart="never" nodeType="tmRoot">
+          <p:childTnLst>
+            <p:seq concurrent="1" nextAc="seek">
+              <p:cTn id="2" dur="indefinite" nodeType="mainSeq">
+                <p:childTnLst>
+                  <p:par>
+                    <p:cTn id="3" fill="hold">
+                      <p:stCondLst>
+                        <p:cond delay="indefinite"/>
+                      </p:stCondLst>
+                      <p:childTnLst>
+                        <p:par>
+                          <p:cTn id="4" fill="hold">
+                            <p:stCondLst>
+                              <p:cond delay="0"/>
+                            </p:stCondLst>
+                            <p:childTnLst>
+                              <p:par>
+                                <p:cTn id="5" presetID="1" presetClass="entr" presetSubtype="0" fill="hold" nodeType="clickEffect">
+                                  <p:stCondLst>
+                                    <p:cond delay="0"/>
+                                  </p:stCondLst>
+                                  <p:childTnLst>
+                                    <p:set>
+                                      <p:cBhvr>
+                                        <p:cTn id="6" dur="1" fill="hold">
+                                          <p:stCondLst>
+                                            <p:cond delay="0"/>
+                                          </p:stCondLst>
+                                        </p:cTn>
+                                        <p:tgtEl>
+                                          <p:spTgt spid="2"/>
                                         </p:tgtEl>
                                         <p:attrNameLst>
                                           <p:attrName>style.visibility</p:attrName>

</xml_diff>